<commit_message>
Added namespace comments for chapter 6 Added chapter 9 - how to use laravel database package Updated slide
</commit_message>
<xml_diff>
--- a/slide.pptx
+++ b/slide.pptx
@@ -6,16 +6,20 @@
   </p:sldMasterIdLst>
   <p:sldIdLst>
     <p:sldId id="256" r:id="rId2"/>
-    <p:sldId id="261" r:id="rId3"/>
-    <p:sldId id="262" r:id="rId4"/>
-    <p:sldId id="263" r:id="rId5"/>
-    <p:sldId id="260" r:id="rId6"/>
-    <p:sldId id="259" r:id="rId7"/>
-    <p:sldId id="257" r:id="rId8"/>
-    <p:sldId id="258" r:id="rId9"/>
-    <p:sldId id="265" r:id="rId10"/>
-    <p:sldId id="266" r:id="rId11"/>
-    <p:sldId id="264" r:id="rId12"/>
+    <p:sldId id="267" r:id="rId3"/>
+    <p:sldId id="261" r:id="rId4"/>
+    <p:sldId id="262" r:id="rId5"/>
+    <p:sldId id="263" r:id="rId6"/>
+    <p:sldId id="260" r:id="rId7"/>
+    <p:sldId id="259" r:id="rId8"/>
+    <p:sldId id="257" r:id="rId9"/>
+    <p:sldId id="269" r:id="rId10"/>
+    <p:sldId id="258" r:id="rId11"/>
+    <p:sldId id="270" r:id="rId12"/>
+    <p:sldId id="265" r:id="rId13"/>
+    <p:sldId id="266" r:id="rId14"/>
+    <p:sldId id="264" r:id="rId15"/>
+    <p:sldId id="268" r:id="rId16"/>
   </p:sldIdLst>
   <p:sldSz cx="12192000" cy="6858000"/>
   <p:notesSz cx="6858000" cy="9144000"/>
@@ -1046,6 +1050,13 @@
         </dgm:presLayoutVars>
       </dgm:prSet>
       <dgm:spPr/>
+      <dgm:t>
+        <a:bodyPr/>
+        <a:lstStyle/>
+        <a:p>
+          <a:endParaRPr lang="en-US"/>
+        </a:p>
+      </dgm:t>
     </dgm:pt>
     <dgm:pt modelId="{C92EE13F-A74C-424F-957E-E60E127054DC}" type="pres">
       <dgm:prSet presAssocID="{B34D89DC-85D2-4D73-A67B-ABD3F243F7D2}" presName="hierRoot1" presStyleCnt="0">
@@ -1066,10 +1077,24 @@
         </dgm:presLayoutVars>
       </dgm:prSet>
       <dgm:spPr/>
+      <dgm:t>
+        <a:bodyPr/>
+        <a:lstStyle/>
+        <a:p>
+          <a:endParaRPr lang="en-US"/>
+        </a:p>
+      </dgm:t>
     </dgm:pt>
     <dgm:pt modelId="{29C3274D-E41D-4113-9414-EE576D264D2E}" type="pres">
       <dgm:prSet presAssocID="{B34D89DC-85D2-4D73-A67B-ABD3F243F7D2}" presName="rootConnector1" presStyleLbl="node1" presStyleIdx="0" presStyleCnt="0"/>
       <dgm:spPr/>
+      <dgm:t>
+        <a:bodyPr/>
+        <a:lstStyle/>
+        <a:p>
+          <a:endParaRPr lang="en-US"/>
+        </a:p>
+      </dgm:t>
     </dgm:pt>
     <dgm:pt modelId="{5B4598AE-0627-47AA-979F-F279AA4DEB90}" type="pres">
       <dgm:prSet presAssocID="{B34D89DC-85D2-4D73-A67B-ABD3F243F7D2}" presName="hierChild2" presStyleCnt="0"/>
@@ -1098,10 +1123,24 @@
         </dgm:presLayoutVars>
       </dgm:prSet>
       <dgm:spPr/>
+      <dgm:t>
+        <a:bodyPr/>
+        <a:lstStyle/>
+        <a:p>
+          <a:endParaRPr lang="en-US"/>
+        </a:p>
+      </dgm:t>
     </dgm:pt>
     <dgm:pt modelId="{9AE914BD-A972-4933-8273-F9533C8C3A28}" type="pres">
       <dgm:prSet presAssocID="{FFA22A60-4309-46C2-828B-EADFED028A56}" presName="rootConnector1" presStyleLbl="node1" presStyleIdx="0" presStyleCnt="0"/>
       <dgm:spPr/>
+      <dgm:t>
+        <a:bodyPr/>
+        <a:lstStyle/>
+        <a:p>
+          <a:endParaRPr lang="en-US"/>
+        </a:p>
+      </dgm:t>
     </dgm:pt>
     <dgm:pt modelId="{69B7497B-642A-45E3-AB49-703985A721A3}" type="pres">
       <dgm:prSet presAssocID="{FFA22A60-4309-46C2-828B-EADFED028A56}" presName="hierChild2" presStyleCnt="0"/>
@@ -1114,6 +1153,13 @@
     <dgm:pt modelId="{717D6524-4147-4A5E-BBA4-6D36ED1A6764}" type="pres">
       <dgm:prSet presAssocID="{C35AB16D-88EF-492A-83C3-CE77BD56BE6B}" presName="Name115" presStyleLbl="parChTrans1D2" presStyleIdx="0" presStyleCnt="2"/>
       <dgm:spPr/>
+      <dgm:t>
+        <a:bodyPr/>
+        <a:lstStyle/>
+        <a:p>
+          <a:endParaRPr lang="en-US"/>
+        </a:p>
+      </dgm:t>
     </dgm:pt>
     <dgm:pt modelId="{09FD8AE9-6B4C-4E85-9B0C-2B227134FFA0}" type="pres">
       <dgm:prSet presAssocID="{08513E77-8ABB-4835-B701-F050998FB551}" presName="hierRoot3" presStyleCnt="0">
@@ -1134,10 +1180,24 @@
         </dgm:presLayoutVars>
       </dgm:prSet>
       <dgm:spPr/>
+      <dgm:t>
+        <a:bodyPr/>
+        <a:lstStyle/>
+        <a:p>
+          <a:endParaRPr lang="en-US"/>
+        </a:p>
+      </dgm:t>
     </dgm:pt>
     <dgm:pt modelId="{A579E724-E0C6-41F6-82F1-093DD41F6A7E}" type="pres">
       <dgm:prSet presAssocID="{08513E77-8ABB-4835-B701-F050998FB551}" presName="rootConnector3" presStyleLbl="asst1" presStyleIdx="0" presStyleCnt="2"/>
       <dgm:spPr/>
+      <dgm:t>
+        <a:bodyPr/>
+        <a:lstStyle/>
+        <a:p>
+          <a:endParaRPr lang="en-US"/>
+        </a:p>
+      </dgm:t>
     </dgm:pt>
     <dgm:pt modelId="{1BE03276-8BD2-4147-83E8-2E25856D8F07}" type="pres">
       <dgm:prSet presAssocID="{08513E77-8ABB-4835-B701-F050998FB551}" presName="hierChild6" presStyleCnt="0"/>
@@ -1150,6 +1210,13 @@
     <dgm:pt modelId="{133A7DED-57B4-4E75-A53D-04A5044B328A}" type="pres">
       <dgm:prSet presAssocID="{A5550148-35B3-4DDA-AB05-E55FAB8953FF}" presName="Name115" presStyleLbl="parChTrans1D2" presStyleIdx="1" presStyleCnt="2"/>
       <dgm:spPr/>
+      <dgm:t>
+        <a:bodyPr/>
+        <a:lstStyle/>
+        <a:p>
+          <a:endParaRPr lang="en-US"/>
+        </a:p>
+      </dgm:t>
     </dgm:pt>
     <dgm:pt modelId="{0F5DDB9A-7EB4-46BB-8978-338CAC558F89}" type="pres">
       <dgm:prSet presAssocID="{2B053B0D-D63A-4079-9049-BC52A79F727A}" presName="hierRoot3" presStyleCnt="0">
@@ -1170,10 +1237,24 @@
         </dgm:presLayoutVars>
       </dgm:prSet>
       <dgm:spPr/>
+      <dgm:t>
+        <a:bodyPr/>
+        <a:lstStyle/>
+        <a:p>
+          <a:endParaRPr lang="en-US"/>
+        </a:p>
+      </dgm:t>
     </dgm:pt>
     <dgm:pt modelId="{D884EF33-B83F-4CC7-B424-C04218DA9C2E}" type="pres">
       <dgm:prSet presAssocID="{2B053B0D-D63A-4079-9049-BC52A79F727A}" presName="rootConnector3" presStyleLbl="asst1" presStyleIdx="1" presStyleCnt="2"/>
       <dgm:spPr/>
+      <dgm:t>
+        <a:bodyPr/>
+        <a:lstStyle/>
+        <a:p>
+          <a:endParaRPr lang="en-US"/>
+        </a:p>
+      </dgm:t>
     </dgm:pt>
     <dgm:pt modelId="{E32C99D5-22CB-4D7A-BFD2-AF1240FD884F}" type="pres">
       <dgm:prSet presAssocID="{2B053B0D-D63A-4079-9049-BC52A79F727A}" presName="hierChild6" presStyleCnt="0"/>
@@ -1185,21 +1266,21 @@
     </dgm:pt>
   </dgm:ptLst>
   <dgm:cxnLst>
+    <dgm:cxn modelId="{F60C9061-A020-4C48-B403-F8D577B314B0}" type="presOf" srcId="{FFA22A60-4309-46C2-828B-EADFED028A56}" destId="{6428163A-FBCE-4143-B42A-2CD98EAB9D1C}" srcOrd="0" destOrd="0" presId="urn:microsoft.com/office/officeart/2009/3/layout/HorizontalOrganizationChart"/>
+    <dgm:cxn modelId="{8CD75FDE-4F71-4DA0-A02A-041CCA37E850}" type="presOf" srcId="{B34D89DC-85D2-4D73-A67B-ABD3F243F7D2}" destId="{29C3274D-E41D-4113-9414-EE576D264D2E}" srcOrd="1" destOrd="0" presId="urn:microsoft.com/office/officeart/2009/3/layout/HorizontalOrganizationChart"/>
+    <dgm:cxn modelId="{7A39B2EE-1BB6-4094-802F-4B53E46B617B}" type="presOf" srcId="{08513E77-8ABB-4835-B701-F050998FB551}" destId="{A579E724-E0C6-41F6-82F1-093DD41F6A7E}" srcOrd="1" destOrd="0" presId="urn:microsoft.com/office/officeart/2009/3/layout/HorizontalOrganizationChart"/>
+    <dgm:cxn modelId="{B65EA6DB-667B-496D-8698-E467F9293674}" type="presOf" srcId="{C35AB16D-88EF-492A-83C3-CE77BD56BE6B}" destId="{717D6524-4147-4A5E-BBA4-6D36ED1A6764}" srcOrd="0" destOrd="0" presId="urn:microsoft.com/office/officeart/2009/3/layout/HorizontalOrganizationChart"/>
+    <dgm:cxn modelId="{5CC13776-412D-4324-BB96-BCD75DD5CEA0}" srcId="{A61A49B0-52B0-4327-816D-59DD2E4D54D2}" destId="{FFA22A60-4309-46C2-828B-EADFED028A56}" srcOrd="1" destOrd="0" parTransId="{22D94BAB-2084-49E4-9691-3B5CA429BB95}" sibTransId="{13E34DBD-1007-4DE1-9088-7D35549FC499}"/>
+    <dgm:cxn modelId="{45D1C4F2-0736-46AE-89A7-88F0E2385CD7}" type="presOf" srcId="{B34D89DC-85D2-4D73-A67B-ABD3F243F7D2}" destId="{8B43B662-2D22-40E9-9871-C7DDB5D307B1}" srcOrd="0" destOrd="0" presId="urn:microsoft.com/office/officeart/2009/3/layout/HorizontalOrganizationChart"/>
+    <dgm:cxn modelId="{DB8814B8-AABD-4C6F-9BB1-AF0093C064DC}" srcId="{FFA22A60-4309-46C2-828B-EADFED028A56}" destId="{08513E77-8ABB-4835-B701-F050998FB551}" srcOrd="0" destOrd="0" parTransId="{C35AB16D-88EF-492A-83C3-CE77BD56BE6B}" sibTransId="{C0D60DDB-9EB1-41D3-BE8E-2867EF94118C}"/>
+    <dgm:cxn modelId="{E84FEBA9-53FD-4D2D-A970-705883D3102D}" type="presOf" srcId="{2B053B0D-D63A-4079-9049-BC52A79F727A}" destId="{D884EF33-B83F-4CC7-B424-C04218DA9C2E}" srcOrd="1" destOrd="0" presId="urn:microsoft.com/office/officeart/2009/3/layout/HorizontalOrganizationChart"/>
+    <dgm:cxn modelId="{410AE5FB-D80C-41E4-BF7A-5F5293941781}" type="presOf" srcId="{08513E77-8ABB-4835-B701-F050998FB551}" destId="{FB4E2408-535C-4D87-9486-4CEEA3D233BA}" srcOrd="0" destOrd="0" presId="urn:microsoft.com/office/officeart/2009/3/layout/HorizontalOrganizationChart"/>
+    <dgm:cxn modelId="{FA418DB0-9271-4600-A8D4-69DC5201A14C}" srcId="{A61A49B0-52B0-4327-816D-59DD2E4D54D2}" destId="{B34D89DC-85D2-4D73-A67B-ABD3F243F7D2}" srcOrd="0" destOrd="0" parTransId="{5DDE46AC-B9EB-46F2-9959-983028D3E655}" sibTransId="{625D0843-2953-4857-AE65-2C4AB558815E}"/>
+    <dgm:cxn modelId="{7E5E233A-60C0-4D21-9AA2-63E26AF6EA2E}" type="presOf" srcId="{2B053B0D-D63A-4079-9049-BC52A79F727A}" destId="{001A3381-A790-4205-94F9-D312A20E87D4}" srcOrd="0" destOrd="0" presId="urn:microsoft.com/office/officeart/2009/3/layout/HorizontalOrganizationChart"/>
+    <dgm:cxn modelId="{DEBF0C57-0940-4856-8CEF-6B6C6330A14E}" srcId="{FFA22A60-4309-46C2-828B-EADFED028A56}" destId="{2B053B0D-D63A-4079-9049-BC52A79F727A}" srcOrd="1" destOrd="0" parTransId="{A5550148-35B3-4DDA-AB05-E55FAB8953FF}" sibTransId="{DFEB8992-88CC-4C76-A287-67C118E80AEB}"/>
+    <dgm:cxn modelId="{206AD0F0-96CF-4DCF-8486-557D9595CA5E}" type="presOf" srcId="{A5550148-35B3-4DDA-AB05-E55FAB8953FF}" destId="{133A7DED-57B4-4E75-A53D-04A5044B328A}" srcOrd="0" destOrd="0" presId="urn:microsoft.com/office/officeart/2009/3/layout/HorizontalOrganizationChart"/>
     <dgm:cxn modelId="{FDED7710-A46A-4883-8812-D87A5F93128A}" type="presOf" srcId="{A61A49B0-52B0-4327-816D-59DD2E4D54D2}" destId="{F7A65510-0CAE-4297-A16C-D38CB76D049B}" srcOrd="0" destOrd="0" presId="urn:microsoft.com/office/officeart/2009/3/layout/HorizontalOrganizationChart"/>
-    <dgm:cxn modelId="{7E5E233A-60C0-4D21-9AA2-63E26AF6EA2E}" type="presOf" srcId="{2B053B0D-D63A-4079-9049-BC52A79F727A}" destId="{001A3381-A790-4205-94F9-D312A20E87D4}" srcOrd="0" destOrd="0" presId="urn:microsoft.com/office/officeart/2009/3/layout/HorizontalOrganizationChart"/>
-    <dgm:cxn modelId="{F60C9061-A020-4C48-B403-F8D577B314B0}" type="presOf" srcId="{FFA22A60-4309-46C2-828B-EADFED028A56}" destId="{6428163A-FBCE-4143-B42A-2CD98EAB9D1C}" srcOrd="0" destOrd="0" presId="urn:microsoft.com/office/officeart/2009/3/layout/HorizontalOrganizationChart"/>
-    <dgm:cxn modelId="{5CC13776-412D-4324-BB96-BCD75DD5CEA0}" srcId="{A61A49B0-52B0-4327-816D-59DD2E4D54D2}" destId="{FFA22A60-4309-46C2-828B-EADFED028A56}" srcOrd="1" destOrd="0" parTransId="{22D94BAB-2084-49E4-9691-3B5CA429BB95}" sibTransId="{13E34DBD-1007-4DE1-9088-7D35549FC499}"/>
-    <dgm:cxn modelId="{DEBF0C57-0940-4856-8CEF-6B6C6330A14E}" srcId="{FFA22A60-4309-46C2-828B-EADFED028A56}" destId="{2B053B0D-D63A-4079-9049-BC52A79F727A}" srcOrd="1" destOrd="0" parTransId="{A5550148-35B3-4DDA-AB05-E55FAB8953FF}" sibTransId="{DFEB8992-88CC-4C76-A287-67C118E80AEB}"/>
-    <dgm:cxn modelId="{E84FEBA9-53FD-4D2D-A970-705883D3102D}" type="presOf" srcId="{2B053B0D-D63A-4079-9049-BC52A79F727A}" destId="{D884EF33-B83F-4CC7-B424-C04218DA9C2E}" srcOrd="1" destOrd="0" presId="urn:microsoft.com/office/officeart/2009/3/layout/HorizontalOrganizationChart"/>
-    <dgm:cxn modelId="{FA418DB0-9271-4600-A8D4-69DC5201A14C}" srcId="{A61A49B0-52B0-4327-816D-59DD2E4D54D2}" destId="{B34D89DC-85D2-4D73-A67B-ABD3F243F7D2}" srcOrd="0" destOrd="0" parTransId="{5DDE46AC-B9EB-46F2-9959-983028D3E655}" sibTransId="{625D0843-2953-4857-AE65-2C4AB558815E}"/>
-    <dgm:cxn modelId="{DB8814B8-AABD-4C6F-9BB1-AF0093C064DC}" srcId="{FFA22A60-4309-46C2-828B-EADFED028A56}" destId="{08513E77-8ABB-4835-B701-F050998FB551}" srcOrd="0" destOrd="0" parTransId="{C35AB16D-88EF-492A-83C3-CE77BD56BE6B}" sibTransId="{C0D60DDB-9EB1-41D3-BE8E-2867EF94118C}"/>
-    <dgm:cxn modelId="{B65EA6DB-667B-496D-8698-E467F9293674}" type="presOf" srcId="{C35AB16D-88EF-492A-83C3-CE77BD56BE6B}" destId="{717D6524-4147-4A5E-BBA4-6D36ED1A6764}" srcOrd="0" destOrd="0" presId="urn:microsoft.com/office/officeart/2009/3/layout/HorizontalOrganizationChart"/>
-    <dgm:cxn modelId="{8CD75FDE-4F71-4DA0-A02A-041CCA37E850}" type="presOf" srcId="{B34D89DC-85D2-4D73-A67B-ABD3F243F7D2}" destId="{29C3274D-E41D-4113-9414-EE576D264D2E}" srcOrd="1" destOrd="0" presId="urn:microsoft.com/office/officeart/2009/3/layout/HorizontalOrganizationChart"/>
     <dgm:cxn modelId="{3AE012E6-FB5E-44B6-80D7-242BB485A44C}" type="presOf" srcId="{FFA22A60-4309-46C2-828B-EADFED028A56}" destId="{9AE914BD-A972-4933-8273-F9533C8C3A28}" srcOrd="1" destOrd="0" presId="urn:microsoft.com/office/officeart/2009/3/layout/HorizontalOrganizationChart"/>
-    <dgm:cxn modelId="{7A39B2EE-1BB6-4094-802F-4B53E46B617B}" type="presOf" srcId="{08513E77-8ABB-4835-B701-F050998FB551}" destId="{A579E724-E0C6-41F6-82F1-093DD41F6A7E}" srcOrd="1" destOrd="0" presId="urn:microsoft.com/office/officeart/2009/3/layout/HorizontalOrganizationChart"/>
-    <dgm:cxn modelId="{206AD0F0-96CF-4DCF-8486-557D9595CA5E}" type="presOf" srcId="{A5550148-35B3-4DDA-AB05-E55FAB8953FF}" destId="{133A7DED-57B4-4E75-A53D-04A5044B328A}" srcOrd="0" destOrd="0" presId="urn:microsoft.com/office/officeart/2009/3/layout/HorizontalOrganizationChart"/>
-    <dgm:cxn modelId="{45D1C4F2-0736-46AE-89A7-88F0E2385CD7}" type="presOf" srcId="{B34D89DC-85D2-4D73-A67B-ABD3F243F7D2}" destId="{8B43B662-2D22-40E9-9871-C7DDB5D307B1}" srcOrd="0" destOrd="0" presId="urn:microsoft.com/office/officeart/2009/3/layout/HorizontalOrganizationChart"/>
-    <dgm:cxn modelId="{410AE5FB-D80C-41E4-BF7A-5F5293941781}" type="presOf" srcId="{08513E77-8ABB-4835-B701-F050998FB551}" destId="{FB4E2408-535C-4D87-9486-4CEEA3D233BA}" srcOrd="0" destOrd="0" presId="urn:microsoft.com/office/officeart/2009/3/layout/HorizontalOrganizationChart"/>
     <dgm:cxn modelId="{9B3117F7-8A7F-4358-84D4-89C90394DC22}" type="presParOf" srcId="{F7A65510-0CAE-4297-A16C-D38CB76D049B}" destId="{C92EE13F-A74C-424F-957E-E60E127054DC}" srcOrd="0" destOrd="0" presId="urn:microsoft.com/office/officeart/2009/3/layout/HorizontalOrganizationChart"/>
     <dgm:cxn modelId="{D5AD3FA3-C55A-4E10-8918-96AD38058E99}" type="presParOf" srcId="{C92EE13F-A74C-424F-957E-E60E127054DC}" destId="{99DC2D0D-B474-4C19-A3BD-CD9E313660CB}" srcOrd="0" destOrd="0" presId="urn:microsoft.com/office/officeart/2009/3/layout/HorizontalOrganizationChart"/>
     <dgm:cxn modelId="{ACD73283-D204-4478-A0A6-B9F023DF400E}" type="presParOf" srcId="{99DC2D0D-B474-4C19-A3BD-CD9E313660CB}" destId="{8B43B662-2D22-40E9-9871-C7DDB5D307B1}" srcOrd="0" destOrd="0" presId="urn:microsoft.com/office/officeart/2009/3/layout/HorizontalOrganizationChart"/>
@@ -1418,7 +1499,7 @@
         </a:bodyPr>
         <a:lstStyle/>
         <a:p>
-          <a:pPr marL="0" lvl="0" indent="0" algn="ctr" defTabSz="1422400">
+          <a:pPr lvl="0" algn="ctr" defTabSz="1422400">
             <a:lnSpc>
               <a:spcPct val="90000"/>
             </a:lnSpc>
@@ -1428,7 +1509,6 @@
             <a:spcAft>
               <a:spcPct val="35000"/>
             </a:spcAft>
-            <a:buNone/>
           </a:pPr>
           <a:r>
             <a:rPr lang="en-MY" sz="3200" kern="1200" dirty="0" err="1"/>
@@ -1497,7 +1577,7 @@
         </a:bodyPr>
         <a:lstStyle/>
         <a:p>
-          <a:pPr marL="0" lvl="0" indent="0" algn="ctr" defTabSz="1422400">
+          <a:pPr lvl="0" algn="ctr" defTabSz="1422400">
             <a:lnSpc>
               <a:spcPct val="90000"/>
             </a:lnSpc>
@@ -1507,7 +1587,6 @@
             <a:spcAft>
               <a:spcPct val="35000"/>
             </a:spcAft>
-            <a:buNone/>
           </a:pPr>
           <a:r>
             <a:rPr lang="en-MY" sz="3200" kern="1200" dirty="0" err="1"/>
@@ -1576,7 +1655,7 @@
         </a:bodyPr>
         <a:lstStyle/>
         <a:p>
-          <a:pPr marL="0" lvl="0" indent="0" algn="ctr" defTabSz="1422400">
+          <a:pPr lvl="0" algn="ctr" defTabSz="1422400">
             <a:lnSpc>
               <a:spcPct val="90000"/>
             </a:lnSpc>
@@ -1586,7 +1665,6 @@
             <a:spcAft>
               <a:spcPct val="35000"/>
             </a:spcAft>
-            <a:buNone/>
           </a:pPr>
           <a:r>
             <a:rPr lang="en-MY" sz="3200" kern="1200" dirty="0"/>
@@ -1659,7 +1737,7 @@
         </a:bodyPr>
         <a:lstStyle/>
         <a:p>
-          <a:pPr marL="0" lvl="0" indent="0" algn="ctr" defTabSz="1422400">
+          <a:pPr lvl="0" algn="ctr" defTabSz="1422400">
             <a:lnSpc>
               <a:spcPct val="90000"/>
             </a:lnSpc>
@@ -1669,7 +1747,6 @@
             <a:spcAft>
               <a:spcPct val="35000"/>
             </a:spcAft>
-            <a:buNone/>
           </a:pPr>
           <a:r>
             <a:rPr lang="en-MY" sz="3200" kern="1200" dirty="0"/>
@@ -3928,10 +4005,53 @@
       </p:grpSpPr>
       <p:sp>
         <p:nvSpPr>
+          <p:cNvPr id="7" name="Rectangle 6"/>
+          <p:cNvSpPr/>
+          <p:nvPr userDrawn="1"/>
+        </p:nvSpPr>
+        <p:spPr>
+          <a:xfrm>
+            <a:off x="0" y="0"/>
+            <a:ext cx="12192000" cy="3495227"/>
+          </a:xfrm>
+          <a:prstGeom prst="rect">
+            <a:avLst/>
+          </a:prstGeom>
+          <a:solidFill>
+            <a:srgbClr val="7030A0"/>
+          </a:solidFill>
+        </p:spPr>
+        <p:style>
+          <a:lnRef idx="2">
+            <a:schemeClr val="accent1">
+              <a:shade val="50000"/>
+            </a:schemeClr>
+          </a:lnRef>
+          <a:fillRef idx="1">
+            <a:schemeClr val="accent1"/>
+          </a:fillRef>
+          <a:effectRef idx="0">
+            <a:schemeClr val="accent1"/>
+          </a:effectRef>
+          <a:fontRef idx="minor">
+            <a:schemeClr val="lt1"/>
+          </a:fontRef>
+        </p:style>
+        <p:txBody>
+          <a:bodyPr rtlCol="0" anchor="ctr"/>
+          <a:lstStyle/>
+          <a:p>
+            <a:pPr algn="ctr"/>
+            <a:endParaRPr lang="en-US" sz="1100"/>
+          </a:p>
+        </p:txBody>
+      </p:sp>
+      <p:sp>
+        <p:nvSpPr>
           <p:cNvPr id="2" name="Title 1">
             <a:extLst>
               <a:ext uri="{FF2B5EF4-FFF2-40B4-BE49-F238E27FC236}">
-                <a16:creationId xmlns:a16="http://schemas.microsoft.com/office/drawing/2014/main" id="{3DBC91CD-1B93-4739-AE31-07AC9B3F83E6}"/>
+                <a16:creationId xmlns:a16="http://schemas.microsoft.com/office/drawing/2014/main" xmlns="" id="{3DBC91CD-1B93-4739-AE31-07AC9B3F83E6}"/>
               </a:ext>
             </a:extLst>
           </p:cNvPr>
@@ -3952,15 +4072,19 @@
           <a:bodyPr anchor="b"/>
           <a:lstStyle>
             <a:lvl1pPr algn="ctr">
-              <a:defRPr sz="6000"/>
+              <a:defRPr sz="6000">
+                <a:solidFill>
+                  <a:schemeClr val="bg1"/>
+                </a:solidFill>
+              </a:defRPr>
             </a:lvl1pPr>
           </a:lstStyle>
           <a:p>
             <a:r>
-              <a:rPr lang="en-US"/>
+              <a:rPr lang="en-US" dirty="0"/>
               <a:t>Click to edit Master title style</a:t>
             </a:r>
-            <a:endParaRPr lang="en-MY"/>
+            <a:endParaRPr lang="en-MY" dirty="0"/>
           </a:p>
         </p:txBody>
       </p:sp>
@@ -3969,7 +4093,7 @@
           <p:cNvPr id="3" name="Subtitle 2">
             <a:extLst>
               <a:ext uri="{FF2B5EF4-FFF2-40B4-BE49-F238E27FC236}">
-                <a16:creationId xmlns:a16="http://schemas.microsoft.com/office/drawing/2014/main" id="{4DEF2BA0-0433-4EC8-B314-A52422ACC105}"/>
+                <a16:creationId xmlns:a16="http://schemas.microsoft.com/office/drawing/2014/main" xmlns="" id="{4DEF2BA0-0433-4EC8-B314-A52422ACC105}"/>
               </a:ext>
             </a:extLst>
           </p:cNvPr>
@@ -4040,7 +4164,7 @@
           <p:cNvPr id="4" name="Date Placeholder 3">
             <a:extLst>
               <a:ext uri="{FF2B5EF4-FFF2-40B4-BE49-F238E27FC236}">
-                <a16:creationId xmlns:a16="http://schemas.microsoft.com/office/drawing/2014/main" id="{2DD531C6-DCCC-4ED2-B1AF-A581FDCC9BA3}"/>
+                <a16:creationId xmlns:a16="http://schemas.microsoft.com/office/drawing/2014/main" xmlns="" id="{2DD531C6-DCCC-4ED2-B1AF-A581FDCC9BA3}"/>
               </a:ext>
             </a:extLst>
           </p:cNvPr>
@@ -4058,7 +4182,7 @@
           <a:p>
             <a:fld id="{6188ECEC-8237-4A66-BCA1-9ED838F97C3C}" type="datetimeFigureOut">
               <a:rPr lang="en-MY" smtClean="0"/>
-              <a:t>9/7/2020</a:t>
+              <a:t>17/7/2020</a:t>
             </a:fld>
             <a:endParaRPr lang="en-MY" dirty="0"/>
           </a:p>
@@ -4069,7 +4193,7 @@
           <p:cNvPr id="5" name="Footer Placeholder 4">
             <a:extLst>
               <a:ext uri="{FF2B5EF4-FFF2-40B4-BE49-F238E27FC236}">
-                <a16:creationId xmlns:a16="http://schemas.microsoft.com/office/drawing/2014/main" id="{692D98F2-4821-4027-96D8-546F74E379C8}"/>
+                <a16:creationId xmlns:a16="http://schemas.microsoft.com/office/drawing/2014/main" xmlns="" id="{692D98F2-4821-4027-96D8-546F74E379C8}"/>
               </a:ext>
             </a:extLst>
           </p:cNvPr>
@@ -4094,7 +4218,7 @@
           <p:cNvPr id="6" name="Slide Number Placeholder 5">
             <a:extLst>
               <a:ext uri="{FF2B5EF4-FFF2-40B4-BE49-F238E27FC236}">
-                <a16:creationId xmlns:a16="http://schemas.microsoft.com/office/drawing/2014/main" id="{1150815F-4901-4EE8-86BD-032EEB5D491E}"/>
+                <a16:creationId xmlns:a16="http://schemas.microsoft.com/office/drawing/2014/main" xmlns="" id="{1150815F-4901-4EE8-86BD-032EEB5D491E}"/>
               </a:ext>
             </a:extLst>
           </p:cNvPr>
@@ -4153,7 +4277,7 @@
           <p:cNvPr id="2" name="Title 1">
             <a:extLst>
               <a:ext uri="{FF2B5EF4-FFF2-40B4-BE49-F238E27FC236}">
-                <a16:creationId xmlns:a16="http://schemas.microsoft.com/office/drawing/2014/main" id="{F90D1321-5BA3-49CB-BAC6-BE239E0A0838}"/>
+                <a16:creationId xmlns:a16="http://schemas.microsoft.com/office/drawing/2014/main" xmlns="" id="{F90D1321-5BA3-49CB-BAC6-BE239E0A0838}"/>
               </a:ext>
             </a:extLst>
           </p:cNvPr>
@@ -4182,7 +4306,7 @@
           <p:cNvPr id="3" name="Vertical Text Placeholder 2">
             <a:extLst>
               <a:ext uri="{FF2B5EF4-FFF2-40B4-BE49-F238E27FC236}">
-                <a16:creationId xmlns:a16="http://schemas.microsoft.com/office/drawing/2014/main" id="{279B1D4D-6B73-4FCA-8910-16F55A63F44E}"/>
+                <a16:creationId xmlns:a16="http://schemas.microsoft.com/office/drawing/2014/main" xmlns="" id="{279B1D4D-6B73-4FCA-8910-16F55A63F44E}"/>
               </a:ext>
             </a:extLst>
           </p:cNvPr>
@@ -4240,7 +4364,7 @@
           <p:cNvPr id="4" name="Date Placeholder 3">
             <a:extLst>
               <a:ext uri="{FF2B5EF4-FFF2-40B4-BE49-F238E27FC236}">
-                <a16:creationId xmlns:a16="http://schemas.microsoft.com/office/drawing/2014/main" id="{E0B23154-B544-49DC-B041-4477774F93A4}"/>
+                <a16:creationId xmlns:a16="http://schemas.microsoft.com/office/drawing/2014/main" xmlns="" id="{E0B23154-B544-49DC-B041-4477774F93A4}"/>
               </a:ext>
             </a:extLst>
           </p:cNvPr>
@@ -4258,7 +4382,7 @@
           <a:p>
             <a:fld id="{6188ECEC-8237-4A66-BCA1-9ED838F97C3C}" type="datetimeFigureOut">
               <a:rPr lang="en-MY" smtClean="0"/>
-              <a:t>9/7/2020</a:t>
+              <a:t>17/7/2020</a:t>
             </a:fld>
             <a:endParaRPr lang="en-MY" dirty="0"/>
           </a:p>
@@ -4269,7 +4393,7 @@
           <p:cNvPr id="5" name="Footer Placeholder 4">
             <a:extLst>
               <a:ext uri="{FF2B5EF4-FFF2-40B4-BE49-F238E27FC236}">
-                <a16:creationId xmlns:a16="http://schemas.microsoft.com/office/drawing/2014/main" id="{D952CB1F-CF1B-4E51-ABC5-16F632F5BCF4}"/>
+                <a16:creationId xmlns:a16="http://schemas.microsoft.com/office/drawing/2014/main" xmlns="" id="{D952CB1F-CF1B-4E51-ABC5-16F632F5BCF4}"/>
               </a:ext>
             </a:extLst>
           </p:cNvPr>
@@ -4294,7 +4418,7 @@
           <p:cNvPr id="6" name="Slide Number Placeholder 5">
             <a:extLst>
               <a:ext uri="{FF2B5EF4-FFF2-40B4-BE49-F238E27FC236}">
-                <a16:creationId xmlns:a16="http://schemas.microsoft.com/office/drawing/2014/main" id="{1C67647E-3DA4-4DF4-82F3-8B0B6BDE648F}"/>
+                <a16:creationId xmlns:a16="http://schemas.microsoft.com/office/drawing/2014/main" xmlns="" id="{1C67647E-3DA4-4DF4-82F3-8B0B6BDE648F}"/>
               </a:ext>
             </a:extLst>
           </p:cNvPr>
@@ -4353,7 +4477,7 @@
           <p:cNvPr id="2" name="Vertical Title 1">
             <a:extLst>
               <a:ext uri="{FF2B5EF4-FFF2-40B4-BE49-F238E27FC236}">
-                <a16:creationId xmlns:a16="http://schemas.microsoft.com/office/drawing/2014/main" id="{86FDC9FE-44F3-4432-8935-1EF18EF36F6B}"/>
+                <a16:creationId xmlns:a16="http://schemas.microsoft.com/office/drawing/2014/main" xmlns="" id="{86FDC9FE-44F3-4432-8935-1EF18EF36F6B}"/>
               </a:ext>
             </a:extLst>
           </p:cNvPr>
@@ -4387,7 +4511,7 @@
           <p:cNvPr id="3" name="Vertical Text Placeholder 2">
             <a:extLst>
               <a:ext uri="{FF2B5EF4-FFF2-40B4-BE49-F238E27FC236}">
-                <a16:creationId xmlns:a16="http://schemas.microsoft.com/office/drawing/2014/main" id="{2B35E2A8-781C-4C04-A4D8-E022629AAB2A}"/>
+                <a16:creationId xmlns:a16="http://schemas.microsoft.com/office/drawing/2014/main" xmlns="" id="{2B35E2A8-781C-4C04-A4D8-E022629AAB2A}"/>
               </a:ext>
             </a:extLst>
           </p:cNvPr>
@@ -4450,7 +4574,7 @@
           <p:cNvPr id="4" name="Date Placeholder 3">
             <a:extLst>
               <a:ext uri="{FF2B5EF4-FFF2-40B4-BE49-F238E27FC236}">
-                <a16:creationId xmlns:a16="http://schemas.microsoft.com/office/drawing/2014/main" id="{78C727C6-5E40-482F-8BCE-34C6917E78A7}"/>
+                <a16:creationId xmlns:a16="http://schemas.microsoft.com/office/drawing/2014/main" xmlns="" id="{78C727C6-5E40-482F-8BCE-34C6917E78A7}"/>
               </a:ext>
             </a:extLst>
           </p:cNvPr>
@@ -4468,7 +4592,7 @@
           <a:p>
             <a:fld id="{6188ECEC-8237-4A66-BCA1-9ED838F97C3C}" type="datetimeFigureOut">
               <a:rPr lang="en-MY" smtClean="0"/>
-              <a:t>9/7/2020</a:t>
+              <a:t>17/7/2020</a:t>
             </a:fld>
             <a:endParaRPr lang="en-MY" dirty="0"/>
           </a:p>
@@ -4479,7 +4603,7 @@
           <p:cNvPr id="5" name="Footer Placeholder 4">
             <a:extLst>
               <a:ext uri="{FF2B5EF4-FFF2-40B4-BE49-F238E27FC236}">
-                <a16:creationId xmlns:a16="http://schemas.microsoft.com/office/drawing/2014/main" id="{A653D20F-0559-45FE-BE84-27D1792F0D5D}"/>
+                <a16:creationId xmlns:a16="http://schemas.microsoft.com/office/drawing/2014/main" xmlns="" id="{A653D20F-0559-45FE-BE84-27D1792F0D5D}"/>
               </a:ext>
             </a:extLst>
           </p:cNvPr>
@@ -4504,7 +4628,7 @@
           <p:cNvPr id="6" name="Slide Number Placeholder 5">
             <a:extLst>
               <a:ext uri="{FF2B5EF4-FFF2-40B4-BE49-F238E27FC236}">
-                <a16:creationId xmlns:a16="http://schemas.microsoft.com/office/drawing/2014/main" id="{DEFA07FC-4973-41B1-80EC-0F981806BEC6}"/>
+                <a16:creationId xmlns:a16="http://schemas.microsoft.com/office/drawing/2014/main" xmlns="" id="{DEFA07FC-4973-41B1-80EC-0F981806BEC6}"/>
               </a:ext>
             </a:extLst>
           </p:cNvPr>
@@ -4560,10 +4684,53 @@
       </p:grpSpPr>
       <p:sp>
         <p:nvSpPr>
+          <p:cNvPr id="8" name="Rectangle 7"/>
+          <p:cNvSpPr/>
+          <p:nvPr userDrawn="1"/>
+        </p:nvSpPr>
+        <p:spPr>
+          <a:xfrm>
+            <a:off x="0" y="-1"/>
+            <a:ext cx="12192000" cy="1683521"/>
+          </a:xfrm>
+          <a:prstGeom prst="rect">
+            <a:avLst/>
+          </a:prstGeom>
+          <a:solidFill>
+            <a:srgbClr val="7030A0"/>
+          </a:solidFill>
+        </p:spPr>
+        <p:style>
+          <a:lnRef idx="2">
+            <a:schemeClr val="accent1">
+              <a:shade val="50000"/>
+            </a:schemeClr>
+          </a:lnRef>
+          <a:fillRef idx="1">
+            <a:schemeClr val="accent1"/>
+          </a:fillRef>
+          <a:effectRef idx="0">
+            <a:schemeClr val="accent1"/>
+          </a:effectRef>
+          <a:fontRef idx="minor">
+            <a:schemeClr val="lt1"/>
+          </a:fontRef>
+        </p:style>
+        <p:txBody>
+          <a:bodyPr rtlCol="0" anchor="ctr"/>
+          <a:lstStyle/>
+          <a:p>
+            <a:pPr algn="ctr"/>
+            <a:endParaRPr lang="en-US" sz="1100"/>
+          </a:p>
+        </p:txBody>
+      </p:sp>
+      <p:sp>
+        <p:nvSpPr>
           <p:cNvPr id="2" name="Title 1">
             <a:extLst>
               <a:ext uri="{FF2B5EF4-FFF2-40B4-BE49-F238E27FC236}">
-                <a16:creationId xmlns:a16="http://schemas.microsoft.com/office/drawing/2014/main" id="{70D3E43A-E946-402B-9E64-1A325B5A9119}"/>
+                <a16:creationId xmlns:a16="http://schemas.microsoft.com/office/drawing/2014/main" xmlns="" id="{70D3E43A-E946-402B-9E64-1A325B5A9119}"/>
               </a:ext>
             </a:extLst>
           </p:cNvPr>
@@ -4577,13 +4744,21 @@
         <p:spPr/>
         <p:txBody>
           <a:bodyPr/>
-          <a:lstStyle/>
-          <a:p>
-            <a:r>
-              <a:rPr lang="en-US"/>
+          <a:lstStyle>
+            <a:lvl1pPr>
+              <a:defRPr>
+                <a:solidFill>
+                  <a:schemeClr val="bg1"/>
+                </a:solidFill>
+              </a:defRPr>
+            </a:lvl1pPr>
+          </a:lstStyle>
+          <a:p>
+            <a:r>
+              <a:rPr lang="en-US" dirty="0"/>
               <a:t>Click to edit Master title style</a:t>
             </a:r>
-            <a:endParaRPr lang="en-MY"/>
+            <a:endParaRPr lang="en-MY" dirty="0"/>
           </a:p>
         </p:txBody>
       </p:sp>
@@ -4592,7 +4767,7 @@
           <p:cNvPr id="3" name="Content Placeholder 2">
             <a:extLst>
               <a:ext uri="{FF2B5EF4-FFF2-40B4-BE49-F238E27FC236}">
-                <a16:creationId xmlns:a16="http://schemas.microsoft.com/office/drawing/2014/main" id="{63BF235C-CC21-4266-A418-E845D75C152A}"/>
+                <a16:creationId xmlns:a16="http://schemas.microsoft.com/office/drawing/2014/main" xmlns="" id="{63BF235C-CC21-4266-A418-E845D75C152A}"/>
               </a:ext>
             </a:extLst>
           </p:cNvPr>
@@ -4650,7 +4825,7 @@
           <p:cNvPr id="4" name="Date Placeholder 3">
             <a:extLst>
               <a:ext uri="{FF2B5EF4-FFF2-40B4-BE49-F238E27FC236}">
-                <a16:creationId xmlns:a16="http://schemas.microsoft.com/office/drawing/2014/main" id="{34543DA7-B859-45D3-A21E-AC410C21DF26}"/>
+                <a16:creationId xmlns:a16="http://schemas.microsoft.com/office/drawing/2014/main" xmlns="" id="{34543DA7-B859-45D3-A21E-AC410C21DF26}"/>
               </a:ext>
             </a:extLst>
           </p:cNvPr>
@@ -4668,7 +4843,7 @@
           <a:p>
             <a:fld id="{6188ECEC-8237-4A66-BCA1-9ED838F97C3C}" type="datetimeFigureOut">
               <a:rPr lang="en-MY" smtClean="0"/>
-              <a:t>9/7/2020</a:t>
+              <a:t>17/7/2020</a:t>
             </a:fld>
             <a:endParaRPr lang="en-MY" dirty="0"/>
           </a:p>
@@ -4679,7 +4854,7 @@
           <p:cNvPr id="5" name="Footer Placeholder 4">
             <a:extLst>
               <a:ext uri="{FF2B5EF4-FFF2-40B4-BE49-F238E27FC236}">
-                <a16:creationId xmlns:a16="http://schemas.microsoft.com/office/drawing/2014/main" id="{EFDE38B0-AC29-402B-8DF4-A4BAE53E8B00}"/>
+                <a16:creationId xmlns:a16="http://schemas.microsoft.com/office/drawing/2014/main" xmlns="" id="{EFDE38B0-AC29-402B-8DF4-A4BAE53E8B00}"/>
               </a:ext>
             </a:extLst>
           </p:cNvPr>
@@ -4704,7 +4879,7 @@
           <p:cNvPr id="6" name="Slide Number Placeholder 5">
             <a:extLst>
               <a:ext uri="{FF2B5EF4-FFF2-40B4-BE49-F238E27FC236}">
-                <a16:creationId xmlns:a16="http://schemas.microsoft.com/office/drawing/2014/main" id="{7CB30AB0-83B1-4C4B-99C9-6F4BD22CFC5D}"/>
+                <a16:creationId xmlns:a16="http://schemas.microsoft.com/office/drawing/2014/main" xmlns="" id="{7CB30AB0-83B1-4C4B-99C9-6F4BD22CFC5D}"/>
               </a:ext>
             </a:extLst>
           </p:cNvPr>
@@ -4763,7 +4938,7 @@
           <p:cNvPr id="2" name="Title 1">
             <a:extLst>
               <a:ext uri="{FF2B5EF4-FFF2-40B4-BE49-F238E27FC236}">
-                <a16:creationId xmlns:a16="http://schemas.microsoft.com/office/drawing/2014/main" id="{9FB1E2AF-3A57-493B-91CC-FE55ECE327AB}"/>
+                <a16:creationId xmlns:a16="http://schemas.microsoft.com/office/drawing/2014/main" xmlns="" id="{9FB1E2AF-3A57-493B-91CC-FE55ECE327AB}"/>
               </a:ext>
             </a:extLst>
           </p:cNvPr>
@@ -4801,7 +4976,7 @@
           <p:cNvPr id="3" name="Text Placeholder 2">
             <a:extLst>
               <a:ext uri="{FF2B5EF4-FFF2-40B4-BE49-F238E27FC236}">
-                <a16:creationId xmlns:a16="http://schemas.microsoft.com/office/drawing/2014/main" id="{D2FB190B-8AFF-4957-A9C5-2FE2D086933E}"/>
+                <a16:creationId xmlns:a16="http://schemas.microsoft.com/office/drawing/2014/main" xmlns="" id="{D2FB190B-8AFF-4957-A9C5-2FE2D086933E}"/>
               </a:ext>
             </a:extLst>
           </p:cNvPr>
@@ -4926,7 +5101,7 @@
           <p:cNvPr id="4" name="Date Placeholder 3">
             <a:extLst>
               <a:ext uri="{FF2B5EF4-FFF2-40B4-BE49-F238E27FC236}">
-                <a16:creationId xmlns:a16="http://schemas.microsoft.com/office/drawing/2014/main" id="{970BC493-1E65-4591-A51B-AFE995F16C65}"/>
+                <a16:creationId xmlns:a16="http://schemas.microsoft.com/office/drawing/2014/main" xmlns="" id="{970BC493-1E65-4591-A51B-AFE995F16C65}"/>
               </a:ext>
             </a:extLst>
           </p:cNvPr>
@@ -4944,7 +5119,7 @@
           <a:p>
             <a:fld id="{6188ECEC-8237-4A66-BCA1-9ED838F97C3C}" type="datetimeFigureOut">
               <a:rPr lang="en-MY" smtClean="0"/>
-              <a:t>9/7/2020</a:t>
+              <a:t>17/7/2020</a:t>
             </a:fld>
             <a:endParaRPr lang="en-MY" dirty="0"/>
           </a:p>
@@ -4955,7 +5130,7 @@
           <p:cNvPr id="5" name="Footer Placeholder 4">
             <a:extLst>
               <a:ext uri="{FF2B5EF4-FFF2-40B4-BE49-F238E27FC236}">
-                <a16:creationId xmlns:a16="http://schemas.microsoft.com/office/drawing/2014/main" id="{52DA9618-EEE1-4D87-B377-2E432510CF88}"/>
+                <a16:creationId xmlns:a16="http://schemas.microsoft.com/office/drawing/2014/main" xmlns="" id="{52DA9618-EEE1-4D87-B377-2E432510CF88}"/>
               </a:ext>
             </a:extLst>
           </p:cNvPr>
@@ -4980,7 +5155,7 @@
           <p:cNvPr id="6" name="Slide Number Placeholder 5">
             <a:extLst>
               <a:ext uri="{FF2B5EF4-FFF2-40B4-BE49-F238E27FC236}">
-                <a16:creationId xmlns:a16="http://schemas.microsoft.com/office/drawing/2014/main" id="{C908A07E-C2BF-48F4-A6BB-4AD3E14B3EDE}"/>
+                <a16:creationId xmlns:a16="http://schemas.microsoft.com/office/drawing/2014/main" xmlns="" id="{C908A07E-C2BF-48F4-A6BB-4AD3E14B3EDE}"/>
               </a:ext>
             </a:extLst>
           </p:cNvPr>
@@ -5036,10 +5211,57 @@
       </p:grpSpPr>
       <p:sp>
         <p:nvSpPr>
+          <p:cNvPr id="8" name="Rectangle 7"/>
+          <p:cNvSpPr/>
+          <p:nvPr userDrawn="1"/>
+        </p:nvSpPr>
+        <p:spPr>
+          <a:xfrm>
+            <a:off x="0" y="-1"/>
+            <a:ext cx="12192000" cy="1683521"/>
+          </a:xfrm>
+          <a:prstGeom prst="rect">
+            <a:avLst/>
+          </a:prstGeom>
+          <a:solidFill>
+            <a:srgbClr val="7030A0"/>
+          </a:solidFill>
+        </p:spPr>
+        <p:style>
+          <a:lnRef idx="2">
+            <a:schemeClr val="accent1">
+              <a:shade val="50000"/>
+            </a:schemeClr>
+          </a:lnRef>
+          <a:fillRef idx="1">
+            <a:schemeClr val="accent1"/>
+          </a:fillRef>
+          <a:effectRef idx="0">
+            <a:schemeClr val="accent1"/>
+          </a:effectRef>
+          <a:fontRef idx="minor">
+            <a:schemeClr val="lt1"/>
+          </a:fontRef>
+        </p:style>
+        <p:txBody>
+          <a:bodyPr rtlCol="0" anchor="ctr"/>
+          <a:lstStyle/>
+          <a:p>
+            <a:pPr algn="ctr"/>
+            <a:endParaRPr lang="en-US" sz="1100">
+              <a:solidFill>
+                <a:schemeClr val="bg1"/>
+              </a:solidFill>
+            </a:endParaRPr>
+          </a:p>
+        </p:txBody>
+      </p:sp>
+      <p:sp>
+        <p:nvSpPr>
           <p:cNvPr id="2" name="Title 1">
             <a:extLst>
               <a:ext uri="{FF2B5EF4-FFF2-40B4-BE49-F238E27FC236}">
-                <a16:creationId xmlns:a16="http://schemas.microsoft.com/office/drawing/2014/main" id="{0104A7AE-9259-47BE-B68D-11D45BEA04A5}"/>
+                <a16:creationId xmlns:a16="http://schemas.microsoft.com/office/drawing/2014/main" xmlns="" id="{0104A7AE-9259-47BE-B68D-11D45BEA04A5}"/>
               </a:ext>
             </a:extLst>
           </p:cNvPr>
@@ -5053,13 +5275,21 @@
         <p:spPr/>
         <p:txBody>
           <a:bodyPr/>
-          <a:lstStyle/>
-          <a:p>
-            <a:r>
-              <a:rPr lang="en-US"/>
+          <a:lstStyle>
+            <a:lvl1pPr>
+              <a:defRPr>
+                <a:solidFill>
+                  <a:schemeClr val="bg1"/>
+                </a:solidFill>
+              </a:defRPr>
+            </a:lvl1pPr>
+          </a:lstStyle>
+          <a:p>
+            <a:r>
+              <a:rPr lang="en-US" dirty="0"/>
               <a:t>Click to edit Master title style</a:t>
             </a:r>
-            <a:endParaRPr lang="en-MY"/>
+            <a:endParaRPr lang="en-MY" dirty="0"/>
           </a:p>
         </p:txBody>
       </p:sp>
@@ -5068,7 +5298,7 @@
           <p:cNvPr id="3" name="Content Placeholder 2">
             <a:extLst>
               <a:ext uri="{FF2B5EF4-FFF2-40B4-BE49-F238E27FC236}">
-                <a16:creationId xmlns:a16="http://schemas.microsoft.com/office/drawing/2014/main" id="{723B0975-0097-4504-9047-448C3317859C}"/>
+                <a16:creationId xmlns:a16="http://schemas.microsoft.com/office/drawing/2014/main" xmlns="" id="{723B0975-0097-4504-9047-448C3317859C}"/>
               </a:ext>
             </a:extLst>
           </p:cNvPr>
@@ -5131,7 +5361,7 @@
           <p:cNvPr id="4" name="Content Placeholder 3">
             <a:extLst>
               <a:ext uri="{FF2B5EF4-FFF2-40B4-BE49-F238E27FC236}">
-                <a16:creationId xmlns:a16="http://schemas.microsoft.com/office/drawing/2014/main" id="{ADD36A40-72AC-4549-9D34-5C89388D0F51}"/>
+                <a16:creationId xmlns:a16="http://schemas.microsoft.com/office/drawing/2014/main" xmlns="" id="{ADD36A40-72AC-4549-9D34-5C89388D0F51}"/>
               </a:ext>
             </a:extLst>
           </p:cNvPr>
@@ -5194,7 +5424,7 @@
           <p:cNvPr id="5" name="Date Placeholder 4">
             <a:extLst>
               <a:ext uri="{FF2B5EF4-FFF2-40B4-BE49-F238E27FC236}">
-                <a16:creationId xmlns:a16="http://schemas.microsoft.com/office/drawing/2014/main" id="{36F532DE-02C3-4AC6-86D6-3780634180FC}"/>
+                <a16:creationId xmlns:a16="http://schemas.microsoft.com/office/drawing/2014/main" xmlns="" id="{36F532DE-02C3-4AC6-86D6-3780634180FC}"/>
               </a:ext>
             </a:extLst>
           </p:cNvPr>
@@ -5212,7 +5442,7 @@
           <a:p>
             <a:fld id="{6188ECEC-8237-4A66-BCA1-9ED838F97C3C}" type="datetimeFigureOut">
               <a:rPr lang="en-MY" smtClean="0"/>
-              <a:t>9/7/2020</a:t>
+              <a:t>17/7/2020</a:t>
             </a:fld>
             <a:endParaRPr lang="en-MY" dirty="0"/>
           </a:p>
@@ -5223,7 +5453,7 @@
           <p:cNvPr id="6" name="Footer Placeholder 5">
             <a:extLst>
               <a:ext uri="{FF2B5EF4-FFF2-40B4-BE49-F238E27FC236}">
-                <a16:creationId xmlns:a16="http://schemas.microsoft.com/office/drawing/2014/main" id="{DEBD8EFC-1B36-4CBD-BC3C-98355D6C003C}"/>
+                <a16:creationId xmlns:a16="http://schemas.microsoft.com/office/drawing/2014/main" xmlns="" id="{DEBD8EFC-1B36-4CBD-BC3C-98355D6C003C}"/>
               </a:ext>
             </a:extLst>
           </p:cNvPr>
@@ -5248,7 +5478,7 @@
           <p:cNvPr id="7" name="Slide Number Placeholder 6">
             <a:extLst>
               <a:ext uri="{FF2B5EF4-FFF2-40B4-BE49-F238E27FC236}">
-                <a16:creationId xmlns:a16="http://schemas.microsoft.com/office/drawing/2014/main" id="{7CF76845-71EE-440D-B8C1-5EA9D9C2E913}"/>
+                <a16:creationId xmlns:a16="http://schemas.microsoft.com/office/drawing/2014/main" xmlns="" id="{7CF76845-71EE-440D-B8C1-5EA9D9C2E913}"/>
               </a:ext>
             </a:extLst>
           </p:cNvPr>
@@ -5304,10 +5534,53 @@
       </p:grpSpPr>
       <p:sp>
         <p:nvSpPr>
+          <p:cNvPr id="10" name="Rectangle 9"/>
+          <p:cNvSpPr/>
+          <p:nvPr userDrawn="1"/>
+        </p:nvSpPr>
+        <p:spPr>
+          <a:xfrm>
+            <a:off x="0" y="-1"/>
+            <a:ext cx="12192000" cy="1683521"/>
+          </a:xfrm>
+          <a:prstGeom prst="rect">
+            <a:avLst/>
+          </a:prstGeom>
+          <a:solidFill>
+            <a:srgbClr val="7030A0"/>
+          </a:solidFill>
+        </p:spPr>
+        <p:style>
+          <a:lnRef idx="2">
+            <a:schemeClr val="accent1">
+              <a:shade val="50000"/>
+            </a:schemeClr>
+          </a:lnRef>
+          <a:fillRef idx="1">
+            <a:schemeClr val="accent1"/>
+          </a:fillRef>
+          <a:effectRef idx="0">
+            <a:schemeClr val="accent1"/>
+          </a:effectRef>
+          <a:fontRef idx="minor">
+            <a:schemeClr val="lt1"/>
+          </a:fontRef>
+        </p:style>
+        <p:txBody>
+          <a:bodyPr rtlCol="0" anchor="ctr"/>
+          <a:lstStyle/>
+          <a:p>
+            <a:pPr algn="ctr"/>
+            <a:endParaRPr lang="en-US" sz="1100"/>
+          </a:p>
+        </p:txBody>
+      </p:sp>
+      <p:sp>
+        <p:nvSpPr>
           <p:cNvPr id="2" name="Title 1">
             <a:extLst>
               <a:ext uri="{FF2B5EF4-FFF2-40B4-BE49-F238E27FC236}">
-                <a16:creationId xmlns:a16="http://schemas.microsoft.com/office/drawing/2014/main" id="{F5CCC5D1-0F18-4813-97E2-171AA80D6D09}"/>
+                <a16:creationId xmlns:a16="http://schemas.microsoft.com/office/drawing/2014/main" xmlns="" id="{F5CCC5D1-0F18-4813-97E2-171AA80D6D09}"/>
               </a:ext>
             </a:extLst>
           </p:cNvPr>
@@ -5326,13 +5599,21 @@
         </p:spPr>
         <p:txBody>
           <a:bodyPr/>
-          <a:lstStyle/>
-          <a:p>
-            <a:r>
-              <a:rPr lang="en-US"/>
+          <a:lstStyle>
+            <a:lvl1pPr>
+              <a:defRPr>
+                <a:solidFill>
+                  <a:schemeClr val="bg1"/>
+                </a:solidFill>
+              </a:defRPr>
+            </a:lvl1pPr>
+          </a:lstStyle>
+          <a:p>
+            <a:r>
+              <a:rPr lang="en-US" dirty="0"/>
               <a:t>Click to edit Master title style</a:t>
             </a:r>
-            <a:endParaRPr lang="en-MY"/>
+            <a:endParaRPr lang="en-MY" dirty="0"/>
           </a:p>
         </p:txBody>
       </p:sp>
@@ -5341,7 +5622,7 @@
           <p:cNvPr id="3" name="Text Placeholder 2">
             <a:extLst>
               <a:ext uri="{FF2B5EF4-FFF2-40B4-BE49-F238E27FC236}">
-                <a16:creationId xmlns:a16="http://schemas.microsoft.com/office/drawing/2014/main" id="{4EC75F79-3862-441A-B3BC-1341520566C9}"/>
+                <a16:creationId xmlns:a16="http://schemas.microsoft.com/office/drawing/2014/main" xmlns="" id="{4EC75F79-3862-441A-B3BC-1341520566C9}"/>
               </a:ext>
             </a:extLst>
           </p:cNvPr>
@@ -5412,7 +5693,7 @@
           <p:cNvPr id="4" name="Content Placeholder 3">
             <a:extLst>
               <a:ext uri="{FF2B5EF4-FFF2-40B4-BE49-F238E27FC236}">
-                <a16:creationId xmlns:a16="http://schemas.microsoft.com/office/drawing/2014/main" id="{B3C069DF-1273-4634-9451-5EFC4DBF9DDB}"/>
+                <a16:creationId xmlns:a16="http://schemas.microsoft.com/office/drawing/2014/main" xmlns="" id="{B3C069DF-1273-4634-9451-5EFC4DBF9DDB}"/>
               </a:ext>
             </a:extLst>
           </p:cNvPr>
@@ -5475,7 +5756,7 @@
           <p:cNvPr id="5" name="Text Placeholder 4">
             <a:extLst>
               <a:ext uri="{FF2B5EF4-FFF2-40B4-BE49-F238E27FC236}">
-                <a16:creationId xmlns:a16="http://schemas.microsoft.com/office/drawing/2014/main" id="{B457B493-421D-4D38-BEF2-98C4BE2634B2}"/>
+                <a16:creationId xmlns:a16="http://schemas.microsoft.com/office/drawing/2014/main" xmlns="" id="{B457B493-421D-4D38-BEF2-98C4BE2634B2}"/>
               </a:ext>
             </a:extLst>
           </p:cNvPr>
@@ -5546,7 +5827,7 @@
           <p:cNvPr id="6" name="Content Placeholder 5">
             <a:extLst>
               <a:ext uri="{FF2B5EF4-FFF2-40B4-BE49-F238E27FC236}">
-                <a16:creationId xmlns:a16="http://schemas.microsoft.com/office/drawing/2014/main" id="{08B40AE6-FED2-4241-933A-552B70FB8664}"/>
+                <a16:creationId xmlns:a16="http://schemas.microsoft.com/office/drawing/2014/main" xmlns="" id="{08B40AE6-FED2-4241-933A-552B70FB8664}"/>
               </a:ext>
             </a:extLst>
           </p:cNvPr>
@@ -5609,7 +5890,7 @@
           <p:cNvPr id="7" name="Date Placeholder 6">
             <a:extLst>
               <a:ext uri="{FF2B5EF4-FFF2-40B4-BE49-F238E27FC236}">
-                <a16:creationId xmlns:a16="http://schemas.microsoft.com/office/drawing/2014/main" id="{89E7E509-D7E0-4869-A488-6BD1355E8F92}"/>
+                <a16:creationId xmlns:a16="http://schemas.microsoft.com/office/drawing/2014/main" xmlns="" id="{89E7E509-D7E0-4869-A488-6BD1355E8F92}"/>
               </a:ext>
             </a:extLst>
           </p:cNvPr>
@@ -5627,7 +5908,7 @@
           <a:p>
             <a:fld id="{6188ECEC-8237-4A66-BCA1-9ED838F97C3C}" type="datetimeFigureOut">
               <a:rPr lang="en-MY" smtClean="0"/>
-              <a:t>9/7/2020</a:t>
+              <a:t>17/7/2020</a:t>
             </a:fld>
             <a:endParaRPr lang="en-MY" dirty="0"/>
           </a:p>
@@ -5638,7 +5919,7 @@
           <p:cNvPr id="8" name="Footer Placeholder 7">
             <a:extLst>
               <a:ext uri="{FF2B5EF4-FFF2-40B4-BE49-F238E27FC236}">
-                <a16:creationId xmlns:a16="http://schemas.microsoft.com/office/drawing/2014/main" id="{BC3D9A78-FB43-4CFD-A839-81F2DB23D2BA}"/>
+                <a16:creationId xmlns:a16="http://schemas.microsoft.com/office/drawing/2014/main" xmlns="" id="{BC3D9A78-FB43-4CFD-A839-81F2DB23D2BA}"/>
               </a:ext>
             </a:extLst>
           </p:cNvPr>
@@ -5663,7 +5944,7 @@
           <p:cNvPr id="9" name="Slide Number Placeholder 8">
             <a:extLst>
               <a:ext uri="{FF2B5EF4-FFF2-40B4-BE49-F238E27FC236}">
-                <a16:creationId xmlns:a16="http://schemas.microsoft.com/office/drawing/2014/main" id="{4C64BE53-7A2E-4138-BC2F-0700FF04DEE1}"/>
+                <a16:creationId xmlns:a16="http://schemas.microsoft.com/office/drawing/2014/main" xmlns="" id="{4C64BE53-7A2E-4138-BC2F-0700FF04DEE1}"/>
               </a:ext>
             </a:extLst>
           </p:cNvPr>
@@ -5719,10 +6000,53 @@
       </p:grpSpPr>
       <p:sp>
         <p:nvSpPr>
+          <p:cNvPr id="7" name="Rectangle 6"/>
+          <p:cNvSpPr/>
+          <p:nvPr userDrawn="1"/>
+        </p:nvSpPr>
+        <p:spPr>
+          <a:xfrm>
+            <a:off x="0" y="-1"/>
+            <a:ext cx="12192000" cy="1683521"/>
+          </a:xfrm>
+          <a:prstGeom prst="rect">
+            <a:avLst/>
+          </a:prstGeom>
+          <a:solidFill>
+            <a:srgbClr val="7030A0"/>
+          </a:solidFill>
+        </p:spPr>
+        <p:style>
+          <a:lnRef idx="2">
+            <a:schemeClr val="accent1">
+              <a:shade val="50000"/>
+            </a:schemeClr>
+          </a:lnRef>
+          <a:fillRef idx="1">
+            <a:schemeClr val="accent1"/>
+          </a:fillRef>
+          <a:effectRef idx="0">
+            <a:schemeClr val="accent1"/>
+          </a:effectRef>
+          <a:fontRef idx="minor">
+            <a:schemeClr val="lt1"/>
+          </a:fontRef>
+        </p:style>
+        <p:txBody>
+          <a:bodyPr rtlCol="0" anchor="ctr"/>
+          <a:lstStyle/>
+          <a:p>
+            <a:pPr algn="ctr"/>
+            <a:endParaRPr lang="en-US" sz="1100"/>
+          </a:p>
+        </p:txBody>
+      </p:sp>
+      <p:sp>
+        <p:nvSpPr>
           <p:cNvPr id="2" name="Title 1">
             <a:extLst>
               <a:ext uri="{FF2B5EF4-FFF2-40B4-BE49-F238E27FC236}">
-                <a16:creationId xmlns:a16="http://schemas.microsoft.com/office/drawing/2014/main" id="{FF9E452B-6226-438C-B854-D3CBC2D943D2}"/>
+                <a16:creationId xmlns:a16="http://schemas.microsoft.com/office/drawing/2014/main" xmlns="" id="{FF9E452B-6226-438C-B854-D3CBC2D943D2}"/>
               </a:ext>
             </a:extLst>
           </p:cNvPr>
@@ -5736,13 +6060,21 @@
         <p:spPr/>
         <p:txBody>
           <a:bodyPr/>
-          <a:lstStyle/>
-          <a:p>
-            <a:r>
-              <a:rPr lang="en-US"/>
+          <a:lstStyle>
+            <a:lvl1pPr>
+              <a:defRPr>
+                <a:solidFill>
+                  <a:schemeClr val="bg1"/>
+                </a:solidFill>
+              </a:defRPr>
+            </a:lvl1pPr>
+          </a:lstStyle>
+          <a:p>
+            <a:r>
+              <a:rPr lang="en-US" dirty="0"/>
               <a:t>Click to edit Master title style</a:t>
             </a:r>
-            <a:endParaRPr lang="en-MY"/>
+            <a:endParaRPr lang="en-MY" dirty="0"/>
           </a:p>
         </p:txBody>
       </p:sp>
@@ -5751,7 +6083,7 @@
           <p:cNvPr id="3" name="Date Placeholder 2">
             <a:extLst>
               <a:ext uri="{FF2B5EF4-FFF2-40B4-BE49-F238E27FC236}">
-                <a16:creationId xmlns:a16="http://schemas.microsoft.com/office/drawing/2014/main" id="{A3772A0B-79D5-4D03-B0BB-BBDDCD95366D}"/>
+                <a16:creationId xmlns:a16="http://schemas.microsoft.com/office/drawing/2014/main" xmlns="" id="{A3772A0B-79D5-4D03-B0BB-BBDDCD95366D}"/>
               </a:ext>
             </a:extLst>
           </p:cNvPr>
@@ -5769,7 +6101,7 @@
           <a:p>
             <a:fld id="{6188ECEC-8237-4A66-BCA1-9ED838F97C3C}" type="datetimeFigureOut">
               <a:rPr lang="en-MY" smtClean="0"/>
-              <a:t>9/7/2020</a:t>
+              <a:t>17/7/2020</a:t>
             </a:fld>
             <a:endParaRPr lang="en-MY" dirty="0"/>
           </a:p>
@@ -5780,7 +6112,7 @@
           <p:cNvPr id="4" name="Footer Placeholder 3">
             <a:extLst>
               <a:ext uri="{FF2B5EF4-FFF2-40B4-BE49-F238E27FC236}">
-                <a16:creationId xmlns:a16="http://schemas.microsoft.com/office/drawing/2014/main" id="{DF852853-62AC-426E-B1B1-93206C4089B8}"/>
+                <a16:creationId xmlns:a16="http://schemas.microsoft.com/office/drawing/2014/main" xmlns="" id="{DF852853-62AC-426E-B1B1-93206C4089B8}"/>
               </a:ext>
             </a:extLst>
           </p:cNvPr>
@@ -5805,7 +6137,7 @@
           <p:cNvPr id="5" name="Slide Number Placeholder 4">
             <a:extLst>
               <a:ext uri="{FF2B5EF4-FFF2-40B4-BE49-F238E27FC236}">
-                <a16:creationId xmlns:a16="http://schemas.microsoft.com/office/drawing/2014/main" id="{6A0009DA-B62E-46AA-81AE-997B91C4B6A1}"/>
+                <a16:creationId xmlns:a16="http://schemas.microsoft.com/office/drawing/2014/main" xmlns="" id="{6A0009DA-B62E-46AA-81AE-997B91C4B6A1}"/>
               </a:ext>
             </a:extLst>
           </p:cNvPr>
@@ -5864,7 +6196,7 @@
           <p:cNvPr id="2" name="Date Placeholder 1">
             <a:extLst>
               <a:ext uri="{FF2B5EF4-FFF2-40B4-BE49-F238E27FC236}">
-                <a16:creationId xmlns:a16="http://schemas.microsoft.com/office/drawing/2014/main" id="{6FD5D68F-426F-4DD7-8AA5-4560F1411FFD}"/>
+                <a16:creationId xmlns:a16="http://schemas.microsoft.com/office/drawing/2014/main" xmlns="" id="{6FD5D68F-426F-4DD7-8AA5-4560F1411FFD}"/>
               </a:ext>
             </a:extLst>
           </p:cNvPr>
@@ -5882,7 +6214,7 @@
           <a:p>
             <a:fld id="{6188ECEC-8237-4A66-BCA1-9ED838F97C3C}" type="datetimeFigureOut">
               <a:rPr lang="en-MY" smtClean="0"/>
-              <a:t>9/7/2020</a:t>
+              <a:t>17/7/2020</a:t>
             </a:fld>
             <a:endParaRPr lang="en-MY" dirty="0"/>
           </a:p>
@@ -5893,7 +6225,7 @@
           <p:cNvPr id="3" name="Footer Placeholder 2">
             <a:extLst>
               <a:ext uri="{FF2B5EF4-FFF2-40B4-BE49-F238E27FC236}">
-                <a16:creationId xmlns:a16="http://schemas.microsoft.com/office/drawing/2014/main" id="{70DD6016-FA6A-4CC0-B1B8-78CD398BE703}"/>
+                <a16:creationId xmlns:a16="http://schemas.microsoft.com/office/drawing/2014/main" xmlns="" id="{70DD6016-FA6A-4CC0-B1B8-78CD398BE703}"/>
               </a:ext>
             </a:extLst>
           </p:cNvPr>
@@ -5918,7 +6250,7 @@
           <p:cNvPr id="4" name="Slide Number Placeholder 3">
             <a:extLst>
               <a:ext uri="{FF2B5EF4-FFF2-40B4-BE49-F238E27FC236}">
-                <a16:creationId xmlns:a16="http://schemas.microsoft.com/office/drawing/2014/main" id="{9C8DD82E-67A4-41C9-8FAB-F17DBCDE1E86}"/>
+                <a16:creationId xmlns:a16="http://schemas.microsoft.com/office/drawing/2014/main" xmlns="" id="{9C8DD82E-67A4-41C9-8FAB-F17DBCDE1E86}"/>
               </a:ext>
             </a:extLst>
           </p:cNvPr>
@@ -5977,7 +6309,7 @@
           <p:cNvPr id="2" name="Title 1">
             <a:extLst>
               <a:ext uri="{FF2B5EF4-FFF2-40B4-BE49-F238E27FC236}">
-                <a16:creationId xmlns:a16="http://schemas.microsoft.com/office/drawing/2014/main" id="{30BD7DAF-F2C4-4830-9E68-89DBEEBE25F1}"/>
+                <a16:creationId xmlns:a16="http://schemas.microsoft.com/office/drawing/2014/main" xmlns="" id="{30BD7DAF-F2C4-4830-9E68-89DBEEBE25F1}"/>
               </a:ext>
             </a:extLst>
           </p:cNvPr>
@@ -6015,7 +6347,7 @@
           <p:cNvPr id="3" name="Content Placeholder 2">
             <a:extLst>
               <a:ext uri="{FF2B5EF4-FFF2-40B4-BE49-F238E27FC236}">
-                <a16:creationId xmlns:a16="http://schemas.microsoft.com/office/drawing/2014/main" id="{7795A1C2-7C9A-4E7E-8C9B-C6278F952BDB}"/>
+                <a16:creationId xmlns:a16="http://schemas.microsoft.com/office/drawing/2014/main" xmlns="" id="{7795A1C2-7C9A-4E7E-8C9B-C6278F952BDB}"/>
               </a:ext>
             </a:extLst>
           </p:cNvPr>
@@ -6106,7 +6438,7 @@
           <p:cNvPr id="4" name="Text Placeholder 3">
             <a:extLst>
               <a:ext uri="{FF2B5EF4-FFF2-40B4-BE49-F238E27FC236}">
-                <a16:creationId xmlns:a16="http://schemas.microsoft.com/office/drawing/2014/main" id="{D6EDC01B-B805-42EB-9A74-B88A8F337550}"/>
+                <a16:creationId xmlns:a16="http://schemas.microsoft.com/office/drawing/2014/main" xmlns="" id="{D6EDC01B-B805-42EB-9A74-B88A8F337550}"/>
               </a:ext>
             </a:extLst>
           </p:cNvPr>
@@ -6177,7 +6509,7 @@
           <p:cNvPr id="5" name="Date Placeholder 4">
             <a:extLst>
               <a:ext uri="{FF2B5EF4-FFF2-40B4-BE49-F238E27FC236}">
-                <a16:creationId xmlns:a16="http://schemas.microsoft.com/office/drawing/2014/main" id="{95485EC3-412B-4E6C-8135-F2E5076F54E4}"/>
+                <a16:creationId xmlns:a16="http://schemas.microsoft.com/office/drawing/2014/main" xmlns="" id="{95485EC3-412B-4E6C-8135-F2E5076F54E4}"/>
               </a:ext>
             </a:extLst>
           </p:cNvPr>
@@ -6195,7 +6527,7 @@
           <a:p>
             <a:fld id="{6188ECEC-8237-4A66-BCA1-9ED838F97C3C}" type="datetimeFigureOut">
               <a:rPr lang="en-MY" smtClean="0"/>
-              <a:t>9/7/2020</a:t>
+              <a:t>17/7/2020</a:t>
             </a:fld>
             <a:endParaRPr lang="en-MY" dirty="0"/>
           </a:p>
@@ -6206,7 +6538,7 @@
           <p:cNvPr id="6" name="Footer Placeholder 5">
             <a:extLst>
               <a:ext uri="{FF2B5EF4-FFF2-40B4-BE49-F238E27FC236}">
-                <a16:creationId xmlns:a16="http://schemas.microsoft.com/office/drawing/2014/main" id="{E29D2705-1991-4261-88D3-30629B71FAD5}"/>
+                <a16:creationId xmlns:a16="http://schemas.microsoft.com/office/drawing/2014/main" xmlns="" id="{E29D2705-1991-4261-88D3-30629B71FAD5}"/>
               </a:ext>
             </a:extLst>
           </p:cNvPr>
@@ -6231,7 +6563,7 @@
           <p:cNvPr id="7" name="Slide Number Placeholder 6">
             <a:extLst>
               <a:ext uri="{FF2B5EF4-FFF2-40B4-BE49-F238E27FC236}">
-                <a16:creationId xmlns:a16="http://schemas.microsoft.com/office/drawing/2014/main" id="{FB74F49E-A254-41B3-A9CA-C56B75F56BDE}"/>
+                <a16:creationId xmlns:a16="http://schemas.microsoft.com/office/drawing/2014/main" xmlns="" id="{FB74F49E-A254-41B3-A9CA-C56B75F56BDE}"/>
               </a:ext>
             </a:extLst>
           </p:cNvPr>
@@ -6290,7 +6622,7 @@
           <p:cNvPr id="2" name="Title 1">
             <a:extLst>
               <a:ext uri="{FF2B5EF4-FFF2-40B4-BE49-F238E27FC236}">
-                <a16:creationId xmlns:a16="http://schemas.microsoft.com/office/drawing/2014/main" id="{54ABDC2F-2488-4322-B60C-6E8CE353E35A}"/>
+                <a16:creationId xmlns:a16="http://schemas.microsoft.com/office/drawing/2014/main" xmlns="" id="{54ABDC2F-2488-4322-B60C-6E8CE353E35A}"/>
               </a:ext>
             </a:extLst>
           </p:cNvPr>
@@ -6328,7 +6660,7 @@
           <p:cNvPr id="3" name="Picture Placeholder 2">
             <a:extLst>
               <a:ext uri="{FF2B5EF4-FFF2-40B4-BE49-F238E27FC236}">
-                <a16:creationId xmlns:a16="http://schemas.microsoft.com/office/drawing/2014/main" id="{A70701A9-8E98-4C26-8E00-1EC582DD9520}"/>
+                <a16:creationId xmlns:a16="http://schemas.microsoft.com/office/drawing/2014/main" xmlns="" id="{A70701A9-8E98-4C26-8E00-1EC582DD9520}"/>
               </a:ext>
             </a:extLst>
           </p:cNvPr>
@@ -6395,7 +6727,7 @@
           <p:cNvPr id="4" name="Text Placeholder 3">
             <a:extLst>
               <a:ext uri="{FF2B5EF4-FFF2-40B4-BE49-F238E27FC236}">
-                <a16:creationId xmlns:a16="http://schemas.microsoft.com/office/drawing/2014/main" id="{8721DA9D-A6F6-43E6-9DEF-E1781BFDC091}"/>
+                <a16:creationId xmlns:a16="http://schemas.microsoft.com/office/drawing/2014/main" xmlns="" id="{8721DA9D-A6F6-43E6-9DEF-E1781BFDC091}"/>
               </a:ext>
             </a:extLst>
           </p:cNvPr>
@@ -6466,7 +6798,7 @@
           <p:cNvPr id="5" name="Date Placeholder 4">
             <a:extLst>
               <a:ext uri="{FF2B5EF4-FFF2-40B4-BE49-F238E27FC236}">
-                <a16:creationId xmlns:a16="http://schemas.microsoft.com/office/drawing/2014/main" id="{28C91790-A257-464B-95E4-92E641FB09A1}"/>
+                <a16:creationId xmlns:a16="http://schemas.microsoft.com/office/drawing/2014/main" xmlns="" id="{28C91790-A257-464B-95E4-92E641FB09A1}"/>
               </a:ext>
             </a:extLst>
           </p:cNvPr>
@@ -6484,7 +6816,7 @@
           <a:p>
             <a:fld id="{6188ECEC-8237-4A66-BCA1-9ED838F97C3C}" type="datetimeFigureOut">
               <a:rPr lang="en-MY" smtClean="0"/>
-              <a:t>9/7/2020</a:t>
+              <a:t>17/7/2020</a:t>
             </a:fld>
             <a:endParaRPr lang="en-MY" dirty="0"/>
           </a:p>
@@ -6495,7 +6827,7 @@
           <p:cNvPr id="6" name="Footer Placeholder 5">
             <a:extLst>
               <a:ext uri="{FF2B5EF4-FFF2-40B4-BE49-F238E27FC236}">
-                <a16:creationId xmlns:a16="http://schemas.microsoft.com/office/drawing/2014/main" id="{B8EE426E-F7EF-4680-B58F-62CE8BAEA461}"/>
+                <a16:creationId xmlns:a16="http://schemas.microsoft.com/office/drawing/2014/main" xmlns="" id="{B8EE426E-F7EF-4680-B58F-62CE8BAEA461}"/>
               </a:ext>
             </a:extLst>
           </p:cNvPr>
@@ -6520,7 +6852,7 @@
           <p:cNvPr id="7" name="Slide Number Placeholder 6">
             <a:extLst>
               <a:ext uri="{FF2B5EF4-FFF2-40B4-BE49-F238E27FC236}">
-                <a16:creationId xmlns:a16="http://schemas.microsoft.com/office/drawing/2014/main" id="{EAC6E235-84E3-435C-A015-3E5D48E4BCC2}"/>
+                <a16:creationId xmlns:a16="http://schemas.microsoft.com/office/drawing/2014/main" xmlns="" id="{EAC6E235-84E3-435C-A015-3E5D48E4BCC2}"/>
               </a:ext>
             </a:extLst>
           </p:cNvPr>
@@ -6584,7 +6916,7 @@
           <p:cNvPr id="2" name="Title Placeholder 1">
             <a:extLst>
               <a:ext uri="{FF2B5EF4-FFF2-40B4-BE49-F238E27FC236}">
-                <a16:creationId xmlns:a16="http://schemas.microsoft.com/office/drawing/2014/main" id="{85719D7F-47BD-4B80-B0BA-A92B1CD8E54F}"/>
+                <a16:creationId xmlns:a16="http://schemas.microsoft.com/office/drawing/2014/main" xmlns="" id="{85719D7F-47BD-4B80-B0BA-A92B1CD8E54F}"/>
               </a:ext>
             </a:extLst>
           </p:cNvPr>
@@ -6623,7 +6955,7 @@
           <p:cNvPr id="3" name="Text Placeholder 2">
             <a:extLst>
               <a:ext uri="{FF2B5EF4-FFF2-40B4-BE49-F238E27FC236}">
-                <a16:creationId xmlns:a16="http://schemas.microsoft.com/office/drawing/2014/main" id="{88A9EF2D-8146-4CF3-9549-139E0633BE70}"/>
+                <a16:creationId xmlns:a16="http://schemas.microsoft.com/office/drawing/2014/main" xmlns="" id="{88A9EF2D-8146-4CF3-9549-139E0633BE70}"/>
               </a:ext>
             </a:extLst>
           </p:cNvPr>
@@ -6691,7 +7023,7 @@
           <p:cNvPr id="4" name="Date Placeholder 3">
             <a:extLst>
               <a:ext uri="{FF2B5EF4-FFF2-40B4-BE49-F238E27FC236}">
-                <a16:creationId xmlns:a16="http://schemas.microsoft.com/office/drawing/2014/main" id="{8C09B42F-A662-4382-B000-A6FC2C975C95}"/>
+                <a16:creationId xmlns:a16="http://schemas.microsoft.com/office/drawing/2014/main" xmlns="" id="{8C09B42F-A662-4382-B000-A6FC2C975C95}"/>
               </a:ext>
             </a:extLst>
           </p:cNvPr>
@@ -6727,7 +7059,7 @@
           <a:p>
             <a:fld id="{6188ECEC-8237-4A66-BCA1-9ED838F97C3C}" type="datetimeFigureOut">
               <a:rPr lang="en-MY" smtClean="0"/>
-              <a:t>9/7/2020</a:t>
+              <a:t>17/7/2020</a:t>
             </a:fld>
             <a:endParaRPr lang="en-MY" dirty="0"/>
           </a:p>
@@ -6738,7 +7070,7 @@
           <p:cNvPr id="5" name="Footer Placeholder 4">
             <a:extLst>
               <a:ext uri="{FF2B5EF4-FFF2-40B4-BE49-F238E27FC236}">
-                <a16:creationId xmlns:a16="http://schemas.microsoft.com/office/drawing/2014/main" id="{FB7476EA-54D4-4363-B10F-CEE2902E092D}"/>
+                <a16:creationId xmlns:a16="http://schemas.microsoft.com/office/drawing/2014/main" xmlns="" id="{FB7476EA-54D4-4363-B10F-CEE2902E092D}"/>
               </a:ext>
             </a:extLst>
           </p:cNvPr>
@@ -6781,7 +7113,7 @@
           <p:cNvPr id="6" name="Slide Number Placeholder 5">
             <a:extLst>
               <a:ext uri="{FF2B5EF4-FFF2-40B4-BE49-F238E27FC236}">
-                <a16:creationId xmlns:a16="http://schemas.microsoft.com/office/drawing/2014/main" id="{4086B668-5444-4F06-ABBE-B40E78D9731B}"/>
+                <a16:creationId xmlns:a16="http://schemas.microsoft.com/office/drawing/2014/main" xmlns="" id="{4086B668-5444-4F06-ABBE-B40E78D9731B}"/>
               </a:ext>
             </a:extLst>
           </p:cNvPr>
@@ -7149,7 +7481,7 @@
           <p:cNvPr id="2" name="Title 1">
             <a:extLst>
               <a:ext uri="{FF2B5EF4-FFF2-40B4-BE49-F238E27FC236}">
-                <a16:creationId xmlns:a16="http://schemas.microsoft.com/office/drawing/2014/main" id="{4F0A2CF2-C0A2-40A3-BBBA-63E1B25F30A5}"/>
+                <a16:creationId xmlns:a16="http://schemas.microsoft.com/office/drawing/2014/main" xmlns="" id="{4F0A2CF2-C0A2-40A3-BBBA-63E1B25F30A5}"/>
               </a:ext>
             </a:extLst>
           </p:cNvPr>
@@ -7165,6 +7497,18 @@
           <a:bodyPr/>
           <a:lstStyle/>
           <a:p>
+            <a:r>
+              <a:rPr lang="en-MY" dirty="0" smtClean="0"/>
+              <a:t>PHP </a:t>
+            </a:r>
+            <a:r>
+              <a:rPr lang="zh-CN" altLang="en-US" dirty="0"/>
+              <a:t>基</a:t>
+            </a:r>
+            <a:r>
+              <a:rPr lang="zh-CN" altLang="en-US" dirty="0" smtClean="0"/>
+              <a:t>础速成班</a:t>
+            </a:r>
             <a:endParaRPr lang="en-MY" dirty="0"/>
           </a:p>
         </p:txBody>
@@ -7174,7 +7518,7 @@
           <p:cNvPr id="3" name="Subtitle 2">
             <a:extLst>
               <a:ext uri="{FF2B5EF4-FFF2-40B4-BE49-F238E27FC236}">
-                <a16:creationId xmlns:a16="http://schemas.microsoft.com/office/drawing/2014/main" id="{B463BC1C-73BE-485F-BD43-0311E45590B4}"/>
+                <a16:creationId xmlns:a16="http://schemas.microsoft.com/office/drawing/2014/main" xmlns="" id="{B463BC1C-73BE-485F-BD43-0311E45590B4}"/>
               </a:ext>
             </a:extLst>
           </p:cNvPr>
@@ -7190,6 +7534,14 @@
           <a:bodyPr/>
           <a:lstStyle/>
           <a:p>
+            <a:r>
+              <a:rPr lang="en-US" altLang="zh-CN" dirty="0" smtClean="0"/>
+              <a:t>2020-07-17 </a:t>
+            </a:r>
+            <a:r>
+              <a:rPr lang="zh-CN" altLang="en-US" dirty="0" smtClean="0"/>
+              <a:t>共思社</a:t>
+            </a:r>
             <a:endParaRPr lang="en-MY" dirty="0"/>
           </a:p>
         </p:txBody>
@@ -7204,6 +7556,13 @@
   <p:clrMapOvr>
     <a:masterClrMapping/>
   </p:clrMapOvr>
+  <p:timing>
+    <p:tnLst>
+      <p:par>
+        <p:cTn id="1" dur="indefinite" restart="never" nodeType="tmRoot"/>
+      </p:par>
+    </p:tnLst>
+  </p:timing>
 </p:sld>
 </file>
 
@@ -7229,7 +7588,7 @@
           <p:cNvPr id="2" name="Title 1">
             <a:extLst>
               <a:ext uri="{FF2B5EF4-FFF2-40B4-BE49-F238E27FC236}">
-                <a16:creationId xmlns:a16="http://schemas.microsoft.com/office/drawing/2014/main" id="{568F3B6C-FC90-4C8E-A06C-D68B59B86461}"/>
+                <a16:creationId xmlns:a16="http://schemas.microsoft.com/office/drawing/2014/main" xmlns="" id="{A11D285D-4F11-491A-8CF9-9AA92130D3A8}"/>
               </a:ext>
             </a:extLst>
           </p:cNvPr>
@@ -7246,6 +7605,395 @@
           <a:lstStyle/>
           <a:p>
             <a:r>
+              <a:rPr lang="zh-CN" altLang="en-US" dirty="0"/>
+              <a:t>复习 </a:t>
+            </a:r>
+            <a:r>
+              <a:rPr lang="en-US" altLang="zh-CN" dirty="0"/>
+              <a:t>/ </a:t>
+            </a:r>
+            <a:r>
+              <a:rPr lang="zh-CN" altLang="en-US" dirty="0"/>
+              <a:t>练习</a:t>
+            </a:r>
+            <a:endParaRPr lang="en-MY" dirty="0"/>
+          </a:p>
+        </p:txBody>
+      </p:sp>
+      <p:sp>
+        <p:nvSpPr>
+          <p:cNvPr id="3" name="Content Placeholder 2">
+            <a:extLst>
+              <a:ext uri="{FF2B5EF4-FFF2-40B4-BE49-F238E27FC236}">
+                <a16:creationId xmlns:a16="http://schemas.microsoft.com/office/drawing/2014/main" xmlns="" id="{106F9E10-F07F-41CB-A0B9-D7DD51AEB422}"/>
+              </a:ext>
+            </a:extLst>
+          </p:cNvPr>
+          <p:cNvSpPr>
+            <a:spLocks noGrp="1"/>
+          </p:cNvSpPr>
+          <p:nvPr>
+            <p:ph idx="1"/>
+          </p:nvPr>
+        </p:nvSpPr>
+        <p:spPr/>
+        <p:txBody>
+          <a:bodyPr/>
+          <a:lstStyle/>
+          <a:p>
+            <a:r>
+              <a:rPr lang="en-MY" dirty="0">
+                <a:hlinkClick r:id="rId2"/>
+              </a:rPr>
+              <a:t>https://www.w3schools.com/php</a:t>
+            </a:r>
+            <a:endParaRPr lang="en-MY" dirty="0"/>
+          </a:p>
+          <a:p>
+            <a:r>
+              <a:rPr lang="en-MY" dirty="0">
+                <a:hlinkClick r:id="rId3"/>
+              </a:rPr>
+              <a:t>https://www.codecademy.com/courses/learn-php</a:t>
+            </a:r>
+            <a:endParaRPr lang="en-MY" dirty="0"/>
+          </a:p>
+        </p:txBody>
+      </p:sp>
+    </p:spTree>
+    <p:extLst>
+      <p:ext uri="{BB962C8B-B14F-4D97-AF65-F5344CB8AC3E}">
+        <p14:creationId xmlns:p14="http://schemas.microsoft.com/office/powerpoint/2010/main" val="1701367885"/>
+      </p:ext>
+    </p:extLst>
+  </p:cSld>
+  <p:clrMapOvr>
+    <a:masterClrMapping/>
+  </p:clrMapOvr>
+</p:sld>
+</file>
+
+<file path=ppt/slides/slide11.xml><?xml version="1.0" encoding="utf-8"?>
+<p:sld xmlns:a="http://schemas.openxmlformats.org/drawingml/2006/main" xmlns:r="http://schemas.openxmlformats.org/officeDocument/2006/relationships" xmlns:p="http://schemas.openxmlformats.org/presentationml/2006/main">
+  <p:cSld>
+    <p:spTree>
+      <p:nvGrpSpPr>
+        <p:cNvPr id="1" name=""/>
+        <p:cNvGrpSpPr/>
+        <p:nvPr/>
+      </p:nvGrpSpPr>
+      <p:grpSpPr>
+        <a:xfrm>
+          <a:off x="0" y="0"/>
+          <a:ext cx="0" cy="0"/>
+          <a:chOff x="0" y="0"/>
+          <a:chExt cx="0" cy="0"/>
+        </a:xfrm>
+      </p:grpSpPr>
+      <p:sp>
+        <p:nvSpPr>
+          <p:cNvPr id="2" name="Title 1"/>
+          <p:cNvSpPr>
+            <a:spLocks noGrp="1"/>
+          </p:cNvSpPr>
+          <p:nvPr>
+            <p:ph type="title"/>
+          </p:nvPr>
+        </p:nvSpPr>
+        <p:spPr/>
+        <p:txBody>
+          <a:bodyPr/>
+          <a:lstStyle/>
+          <a:p>
+            <a:r>
+              <a:rPr lang="en-US" dirty="0" smtClean="0"/>
+              <a:t>Chapter 6: Composer</a:t>
+            </a:r>
+            <a:endParaRPr lang="en-US" dirty="0"/>
+          </a:p>
+        </p:txBody>
+      </p:sp>
+      <p:sp>
+        <p:nvSpPr>
+          <p:cNvPr id="3" name="Content Placeholder 2"/>
+          <p:cNvSpPr>
+            <a:spLocks noGrp="1"/>
+          </p:cNvSpPr>
+          <p:nvPr>
+            <p:ph idx="1"/>
+          </p:nvPr>
+        </p:nvSpPr>
+        <p:spPr/>
+        <p:txBody>
+          <a:bodyPr/>
+          <a:lstStyle/>
+          <a:p>
+            <a:r>
+              <a:rPr lang="en-US" dirty="0" smtClean="0"/>
+              <a:t>getcomposer.org</a:t>
+            </a:r>
+          </a:p>
+          <a:p>
+            <a:r>
+              <a:rPr lang="en-US" dirty="0" smtClean="0"/>
+              <a:t>composer </a:t>
+            </a:r>
+            <a:r>
+              <a:rPr lang="en-US" dirty="0" err="1" smtClean="0"/>
+              <a:t>init</a:t>
+            </a:r>
+            <a:endParaRPr lang="en-US" dirty="0" smtClean="0"/>
+          </a:p>
+          <a:p>
+            <a:r>
+              <a:rPr lang="en-US" dirty="0" smtClean="0"/>
+              <a:t>composer require xxx/xxx</a:t>
+            </a:r>
+          </a:p>
+          <a:p>
+            <a:r>
+              <a:rPr lang="en-US" dirty="0" smtClean="0"/>
+              <a:t>composer update</a:t>
+            </a:r>
+          </a:p>
+          <a:p>
+            <a:r>
+              <a:rPr lang="en-US" dirty="0" smtClean="0"/>
+              <a:t>composer install</a:t>
+            </a:r>
+          </a:p>
+          <a:p>
+            <a:r>
+              <a:rPr lang="en-US" dirty="0" smtClean="0"/>
+              <a:t>composer </a:t>
+            </a:r>
+            <a:r>
+              <a:rPr lang="en-US" dirty="0" err="1" smtClean="0"/>
+              <a:t>dumpautoload</a:t>
+            </a:r>
+            <a:endParaRPr lang="en-US" dirty="0"/>
+          </a:p>
+        </p:txBody>
+      </p:sp>
+    </p:spTree>
+    <p:extLst>
+      <p:ext uri="{BB962C8B-B14F-4D97-AF65-F5344CB8AC3E}">
+        <p14:creationId xmlns:p14="http://schemas.microsoft.com/office/powerpoint/2010/main" val="3854635482"/>
+      </p:ext>
+    </p:extLst>
+  </p:cSld>
+  <p:clrMapOvr>
+    <a:masterClrMapping/>
+  </p:clrMapOvr>
+</p:sld>
+</file>
+
+<file path=ppt/slides/slide12.xml><?xml version="1.0" encoding="utf-8"?>
+<p:sld xmlns:a="http://schemas.openxmlformats.org/drawingml/2006/main" xmlns:r="http://schemas.openxmlformats.org/officeDocument/2006/relationships" xmlns:p="http://schemas.openxmlformats.org/presentationml/2006/main">
+  <p:cSld>
+    <p:spTree>
+      <p:nvGrpSpPr>
+        <p:cNvPr id="1" name=""/>
+        <p:cNvGrpSpPr/>
+        <p:nvPr/>
+      </p:nvGrpSpPr>
+      <p:grpSpPr>
+        <a:xfrm>
+          <a:off x="0" y="0"/>
+          <a:ext cx="0" cy="0"/>
+          <a:chOff x="0" y="0"/>
+          <a:chExt cx="0" cy="0"/>
+        </a:xfrm>
+      </p:grpSpPr>
+      <p:sp>
+        <p:nvSpPr>
+          <p:cNvPr id="2" name="Title 1">
+            <a:extLst>
+              <a:ext uri="{FF2B5EF4-FFF2-40B4-BE49-F238E27FC236}">
+                <a16:creationId xmlns:a16="http://schemas.microsoft.com/office/drawing/2014/main" xmlns="" id="{1487C1F5-F0F7-4AD6-8B3A-7B9B9A82DC89}"/>
+              </a:ext>
+            </a:extLst>
+          </p:cNvPr>
+          <p:cNvSpPr>
+            <a:spLocks noGrp="1"/>
+          </p:cNvSpPr>
+          <p:nvPr>
+            <p:ph type="title"/>
+          </p:nvPr>
+        </p:nvSpPr>
+        <p:spPr/>
+        <p:txBody>
+          <a:bodyPr/>
+          <a:lstStyle/>
+          <a:p>
+            <a:r>
+              <a:rPr lang="en-MY" dirty="0"/>
+              <a:t>Chapter 7: </a:t>
+            </a:r>
+            <a:r>
+              <a:rPr lang="zh-CN" altLang="en-US" dirty="0"/>
+              <a:t>简易</a:t>
+            </a:r>
+            <a:r>
+              <a:rPr lang="en-MY" dirty="0"/>
+              <a:t> MVC</a:t>
+            </a:r>
+          </a:p>
+        </p:txBody>
+      </p:sp>
+      <p:graphicFrame>
+        <p:nvGraphicFramePr>
+          <p:cNvPr id="4" name="Content Placeholder 3">
+            <a:extLst>
+              <a:ext uri="{FF2B5EF4-FFF2-40B4-BE49-F238E27FC236}">
+                <a16:creationId xmlns:a16="http://schemas.microsoft.com/office/drawing/2014/main" xmlns="" id="{E1C2739E-18DA-4EC1-A03F-130DF4E6013C}"/>
+              </a:ext>
+            </a:extLst>
+          </p:cNvPr>
+          <p:cNvGraphicFramePr>
+            <a:graphicFrameLocks noGrp="1"/>
+          </p:cNvGraphicFramePr>
+          <p:nvPr>
+            <p:ph idx="1"/>
+            <p:extLst>
+              <p:ext uri="{D42A27DB-BD31-4B8C-83A1-F6EECF244321}">
+                <p14:modId xmlns:p14="http://schemas.microsoft.com/office/powerpoint/2010/main" val="3601426238"/>
+              </p:ext>
+            </p:extLst>
+          </p:nvPr>
+        </p:nvGraphicFramePr>
+        <p:xfrm>
+          <a:off x="2499692" y="2117176"/>
+          <a:ext cx="7192617" cy="2799385"/>
+        </p:xfrm>
+        <a:graphic>
+          <a:graphicData uri="http://schemas.openxmlformats.org/drawingml/2006/diagram">
+            <dgm:relIds xmlns:dgm="http://schemas.openxmlformats.org/drawingml/2006/diagram" xmlns:r="http://schemas.openxmlformats.org/officeDocument/2006/relationships" r:dm="rId2" r:lo="rId3" r:qs="rId4" r:cs="rId5"/>
+          </a:graphicData>
+        </a:graphic>
+      </p:graphicFrame>
+      <p:sp>
+        <p:nvSpPr>
+          <p:cNvPr id="5" name="TextBox 4">
+            <a:extLst>
+              <a:ext uri="{FF2B5EF4-FFF2-40B4-BE49-F238E27FC236}">
+                <a16:creationId xmlns:a16="http://schemas.microsoft.com/office/drawing/2014/main" xmlns="" id="{ABE5A290-561B-4259-BAA4-CD33A510BD2A}"/>
+              </a:ext>
+            </a:extLst>
+          </p:cNvPr>
+          <p:cNvSpPr txBox="1"/>
+          <p:nvPr/>
+        </p:nvSpPr>
+        <p:spPr>
+          <a:xfrm>
+            <a:off x="3710609" y="5213307"/>
+            <a:ext cx="1517147" cy="461665"/>
+          </a:xfrm>
+          <a:prstGeom prst="rect">
+            <a:avLst/>
+          </a:prstGeom>
+          <a:noFill/>
+        </p:spPr>
+        <p:txBody>
+          <a:bodyPr wrap="none" rtlCol="0">
+            <a:spAutoFit/>
+          </a:bodyPr>
+          <a:lstStyle/>
+          <a:p>
+            <a:r>
+              <a:rPr lang="en-MY" sz="2400" dirty="0"/>
+              <a:t>controllers</a:t>
+            </a:r>
+          </a:p>
+        </p:txBody>
+      </p:sp>
+      <p:sp>
+        <p:nvSpPr>
+          <p:cNvPr id="6" name="TextBox 5">
+            <a:extLst>
+              <a:ext uri="{FF2B5EF4-FFF2-40B4-BE49-F238E27FC236}">
+                <a16:creationId xmlns:a16="http://schemas.microsoft.com/office/drawing/2014/main" xmlns="" id="{37B74463-DBE4-413A-B885-F77F4E0413A3}"/>
+              </a:ext>
+            </a:extLst>
+          </p:cNvPr>
+          <p:cNvSpPr txBox="1"/>
+          <p:nvPr/>
+        </p:nvSpPr>
+        <p:spPr>
+          <a:xfrm>
+            <a:off x="7586869" y="5205254"/>
+            <a:ext cx="884216" cy="461665"/>
+          </a:xfrm>
+          <a:prstGeom prst="rect">
+            <a:avLst/>
+          </a:prstGeom>
+          <a:noFill/>
+        </p:spPr>
+        <p:txBody>
+          <a:bodyPr wrap="none" rtlCol="0">
+            <a:spAutoFit/>
+          </a:bodyPr>
+          <a:lstStyle/>
+          <a:p>
+            <a:r>
+              <a:rPr lang="en-MY" sz="2400" dirty="0"/>
+              <a:t>views</a:t>
+            </a:r>
+          </a:p>
+        </p:txBody>
+      </p:sp>
+    </p:spTree>
+    <p:extLst>
+      <p:ext uri="{BB962C8B-B14F-4D97-AF65-F5344CB8AC3E}">
+        <p14:creationId xmlns:p14="http://schemas.microsoft.com/office/powerpoint/2010/main" val="2927943225"/>
+      </p:ext>
+    </p:extLst>
+  </p:cSld>
+  <p:clrMapOvr>
+    <a:masterClrMapping/>
+  </p:clrMapOvr>
+</p:sld>
+</file>
+
+<file path=ppt/slides/slide13.xml><?xml version="1.0" encoding="utf-8"?>
+<p:sld xmlns:a="http://schemas.openxmlformats.org/drawingml/2006/main" xmlns:r="http://schemas.openxmlformats.org/officeDocument/2006/relationships" xmlns:p="http://schemas.openxmlformats.org/presentationml/2006/main">
+  <p:cSld>
+    <p:spTree>
+      <p:nvGrpSpPr>
+        <p:cNvPr id="1" name=""/>
+        <p:cNvGrpSpPr/>
+        <p:nvPr/>
+      </p:nvGrpSpPr>
+      <p:grpSpPr>
+        <a:xfrm>
+          <a:off x="0" y="0"/>
+          <a:ext cx="0" cy="0"/>
+          <a:chOff x="0" y="0"/>
+          <a:chExt cx="0" cy="0"/>
+        </a:xfrm>
+      </p:grpSpPr>
+      <p:sp>
+        <p:nvSpPr>
+          <p:cNvPr id="2" name="Title 1">
+            <a:extLst>
+              <a:ext uri="{FF2B5EF4-FFF2-40B4-BE49-F238E27FC236}">
+                <a16:creationId xmlns:a16="http://schemas.microsoft.com/office/drawing/2014/main" xmlns="" id="{568F3B6C-FC90-4C8E-A06C-D68B59B86461}"/>
+              </a:ext>
+            </a:extLst>
+          </p:cNvPr>
+          <p:cNvSpPr>
+            <a:spLocks noGrp="1"/>
+          </p:cNvSpPr>
+          <p:nvPr>
+            <p:ph type="title"/>
+          </p:nvPr>
+        </p:nvSpPr>
+        <p:spPr/>
+        <p:txBody>
+          <a:bodyPr/>
+          <a:lstStyle/>
+          <a:p>
+            <a:r>
               <a:rPr lang="en-MY" dirty="0"/>
               <a:t>Chapter 7: MVC</a:t>
             </a:r>
@@ -7257,7 +8005,7 @@
           <p:cNvPr id="2052" name="Picture 4" descr="Model-View-Controller (MVC) | by Thereviewstories | Data Driven ...">
             <a:extLst>
               <a:ext uri="{FF2B5EF4-FFF2-40B4-BE49-F238E27FC236}">
-                <a16:creationId xmlns:a16="http://schemas.microsoft.com/office/drawing/2014/main" id="{3653548E-3A4B-4333-9C6F-F021B32C452B}"/>
+                <a16:creationId xmlns:a16="http://schemas.microsoft.com/office/drawing/2014/main" xmlns="" id="{3653548E-3A4B-4333-9C6F-F021B32C452B}"/>
               </a:ext>
             </a:extLst>
           </p:cNvPr>
@@ -7305,7 +8053,7 @@
           <p:cNvPr id="4" name="Content Placeholder 3">
             <a:extLst>
               <a:ext uri="{FF2B5EF4-FFF2-40B4-BE49-F238E27FC236}">
-                <a16:creationId xmlns:a16="http://schemas.microsoft.com/office/drawing/2014/main" id="{D6705351-B333-498D-984E-6FFBE5C54C7C}"/>
+                <a16:creationId xmlns:a16="http://schemas.microsoft.com/office/drawing/2014/main" xmlns="" id="{D6705351-B333-498D-984E-6FFBE5C54C7C}"/>
               </a:ext>
             </a:extLst>
           </p:cNvPr>
@@ -7370,7 +8118,7 @@
 </p:sld>
 </file>
 
-<file path=ppt/slides/slide11.xml><?xml version="1.0" encoding="utf-8"?>
+<file path=ppt/slides/slide14.xml><?xml version="1.0" encoding="utf-8"?>
 <p:sld xmlns:a="http://schemas.openxmlformats.org/drawingml/2006/main" xmlns:r="http://schemas.openxmlformats.org/officeDocument/2006/relationships" xmlns:p="http://schemas.openxmlformats.org/presentationml/2006/main">
   <p:cSld>
     <p:spTree>
@@ -7392,7 +8140,7 @@
           <p:cNvPr id="2" name="Title 1">
             <a:extLst>
               <a:ext uri="{FF2B5EF4-FFF2-40B4-BE49-F238E27FC236}">
-                <a16:creationId xmlns:a16="http://schemas.microsoft.com/office/drawing/2014/main" id="{E617825A-6DA8-4EEB-8E1C-884CFF8AAE33}"/>
+                <a16:creationId xmlns:a16="http://schemas.microsoft.com/office/drawing/2014/main" xmlns="" id="{E617825A-6DA8-4EEB-8E1C-884CFF8AAE33}"/>
               </a:ext>
             </a:extLst>
           </p:cNvPr>
@@ -7410,8 +8158,33 @@
           <a:p>
             <a:r>
               <a:rPr lang="en-MY" dirty="0"/>
-              <a:t>Chapter 8: Slim framework</a:t>
-            </a:r>
+              <a:t>Chapter </a:t>
+            </a:r>
+            <a:r>
+              <a:rPr lang="en-MY" dirty="0" smtClean="0"/>
+              <a:t>8: </a:t>
+            </a:r>
+            <a:r>
+              <a:rPr lang="zh-CN" altLang="en-US" dirty="0" smtClean="0"/>
+              <a:t>用 </a:t>
+            </a:r>
+            <a:r>
+              <a:rPr lang="en-MY" dirty="0" err="1" smtClean="0"/>
+              <a:t>Codeception</a:t>
+            </a:r>
+            <a:r>
+              <a:rPr lang="en-MY" dirty="0" smtClean="0"/>
+              <a:t> </a:t>
+            </a:r>
+            <a:r>
+              <a:rPr lang="zh-CN" altLang="en-US" dirty="0" smtClean="0"/>
+              <a:t>做 </a:t>
+            </a:r>
+            <a:r>
+              <a:rPr lang="en-MY" dirty="0"/>
+              <a:t>Unit Test </a:t>
+            </a:r>
+            <a:endParaRPr lang="en-MY" dirty="0"/>
           </a:p>
         </p:txBody>
       </p:sp>
@@ -7420,7 +8193,7 @@
           <p:cNvPr id="3" name="Content Placeholder 2">
             <a:extLst>
               <a:ext uri="{FF2B5EF4-FFF2-40B4-BE49-F238E27FC236}">
-                <a16:creationId xmlns:a16="http://schemas.microsoft.com/office/drawing/2014/main" id="{2C1EF03C-8091-4E72-9FE3-483A23B94990}"/>
+                <a16:creationId xmlns:a16="http://schemas.microsoft.com/office/drawing/2014/main" xmlns="" id="{2C1EF03C-8091-4E72-9FE3-483A23B94990}"/>
               </a:ext>
             </a:extLst>
           </p:cNvPr>
@@ -7437,31 +8210,8 @@
           <a:lstStyle/>
           <a:p>
             <a:r>
-              <a:rPr lang="en-MY" dirty="0"/>
-              <a:t>composer create-project slim/</a:t>
-            </a:r>
-            <a:r>
-              <a:rPr lang="en-MY" dirty="0" err="1"/>
-              <a:t>slim-skeleton:dev-master</a:t>
-            </a:r>
-            <a:r>
-              <a:rPr lang="en-MY" dirty="0"/>
-              <a:t> lesson7</a:t>
-            </a:r>
-          </a:p>
-          <a:p>
-            <a:endParaRPr lang="en-MY" dirty="0"/>
-          </a:p>
-          <a:p>
-            <a:r>
-              <a:rPr lang="en-MY" dirty="0"/>
-              <a:t>Reference: </a:t>
-            </a:r>
-            <a:r>
-              <a:rPr lang="en-MY" dirty="0">
-                <a:hlinkClick r:id="rId2"/>
-              </a:rPr>
-              <a:t>http://www.slimframework.com/</a:t>
+              <a:rPr lang="en-MY" dirty="0" smtClean="0"/>
+              <a:t>codeception.com</a:t>
             </a:r>
             <a:endParaRPr lang="en-MY" dirty="0"/>
           </a:p>
@@ -7477,6 +8227,132 @@
   <p:clrMapOvr>
     <a:masterClrMapping/>
   </p:clrMapOvr>
+  <mc:AlternateContent xmlns:mc="http://schemas.openxmlformats.org/markup-compatibility/2006">
+    <mc:Choice xmlns:p14="http://schemas.microsoft.com/office/powerpoint/2010/main" Requires="p14">
+      <p:transition spd="slow" p14:dur="2000"/>
+    </mc:Choice>
+    <mc:Fallback>
+      <p:transition spd="slow"/>
+    </mc:Fallback>
+  </mc:AlternateContent>
+</p:sld>
+</file>
+
+<file path=ppt/slides/slide15.xml><?xml version="1.0" encoding="utf-8"?>
+<p:sld xmlns:a="http://schemas.openxmlformats.org/drawingml/2006/main" xmlns:r="http://schemas.openxmlformats.org/officeDocument/2006/relationships" xmlns:p="http://schemas.openxmlformats.org/presentationml/2006/main" show="0">
+  <p:cSld>
+    <p:spTree>
+      <p:nvGrpSpPr>
+        <p:cNvPr id="1" name=""/>
+        <p:cNvGrpSpPr/>
+        <p:nvPr/>
+      </p:nvGrpSpPr>
+      <p:grpSpPr>
+        <a:xfrm>
+          <a:off x="0" y="0"/>
+          <a:ext cx="0" cy="0"/>
+          <a:chOff x="0" y="0"/>
+          <a:chExt cx="0" cy="0"/>
+        </a:xfrm>
+      </p:grpSpPr>
+      <p:sp>
+        <p:nvSpPr>
+          <p:cNvPr id="2" name="Title 1">
+            <a:extLst>
+              <a:ext uri="{FF2B5EF4-FFF2-40B4-BE49-F238E27FC236}">
+                <a16:creationId xmlns:a16="http://schemas.microsoft.com/office/drawing/2014/main" xmlns="" id="{E617825A-6DA8-4EEB-8E1C-884CFF8AAE33}"/>
+              </a:ext>
+            </a:extLst>
+          </p:cNvPr>
+          <p:cNvSpPr>
+            <a:spLocks noGrp="1"/>
+          </p:cNvSpPr>
+          <p:nvPr>
+            <p:ph type="title"/>
+          </p:nvPr>
+        </p:nvSpPr>
+        <p:spPr/>
+        <p:txBody>
+          <a:bodyPr/>
+          <a:lstStyle/>
+          <a:p>
+            <a:r>
+              <a:rPr lang="en-MY" dirty="0"/>
+              <a:t>Chapter 8: Slim framework</a:t>
+            </a:r>
+          </a:p>
+        </p:txBody>
+      </p:sp>
+      <p:sp>
+        <p:nvSpPr>
+          <p:cNvPr id="3" name="Content Placeholder 2">
+            <a:extLst>
+              <a:ext uri="{FF2B5EF4-FFF2-40B4-BE49-F238E27FC236}">
+                <a16:creationId xmlns:a16="http://schemas.microsoft.com/office/drawing/2014/main" xmlns="" id="{2C1EF03C-8091-4E72-9FE3-483A23B94990}"/>
+              </a:ext>
+            </a:extLst>
+          </p:cNvPr>
+          <p:cNvSpPr>
+            <a:spLocks noGrp="1"/>
+          </p:cNvSpPr>
+          <p:nvPr>
+            <p:ph idx="1"/>
+          </p:nvPr>
+        </p:nvSpPr>
+        <p:spPr/>
+        <p:txBody>
+          <a:bodyPr/>
+          <a:lstStyle/>
+          <a:p>
+            <a:r>
+              <a:rPr lang="en-MY" dirty="0"/>
+              <a:t>composer create-project slim/</a:t>
+            </a:r>
+            <a:r>
+              <a:rPr lang="en-MY" dirty="0" err="1"/>
+              <a:t>slim-skeleton:dev-master</a:t>
+            </a:r>
+            <a:r>
+              <a:rPr lang="en-MY" dirty="0"/>
+              <a:t> lesson7</a:t>
+            </a:r>
+          </a:p>
+          <a:p>
+            <a:endParaRPr lang="en-MY" dirty="0"/>
+          </a:p>
+          <a:p>
+            <a:r>
+              <a:rPr lang="en-MY" dirty="0"/>
+              <a:t>Reference: </a:t>
+            </a:r>
+            <a:r>
+              <a:rPr lang="en-MY" dirty="0">
+                <a:hlinkClick r:id="rId2"/>
+              </a:rPr>
+              <a:t>http://www.slimframework.com/</a:t>
+            </a:r>
+            <a:endParaRPr lang="en-MY" dirty="0"/>
+          </a:p>
+        </p:txBody>
+      </p:sp>
+    </p:spTree>
+    <p:extLst>
+      <p:ext uri="{BB962C8B-B14F-4D97-AF65-F5344CB8AC3E}">
+        <p14:creationId xmlns:p14="http://schemas.microsoft.com/office/powerpoint/2010/main" val="674082243"/>
+      </p:ext>
+    </p:extLst>
+  </p:cSld>
+  <p:clrMapOvr>
+    <a:masterClrMapping/>
+  </p:clrMapOvr>
+  <mc:AlternateContent xmlns:mc="http://schemas.openxmlformats.org/markup-compatibility/2006">
+    <mc:Choice xmlns:p14="http://schemas.microsoft.com/office/powerpoint/2010/main" Requires="p14">
+      <p:transition spd="slow" p14:dur="2000"/>
+    </mc:Choice>
+    <mc:Fallback>
+      <p:transition spd="slow"/>
+    </mc:Fallback>
+  </mc:AlternateContent>
 </p:sld>
 </file>
 
@@ -7499,10 +8375,154 @@
       </p:grpSpPr>
       <p:sp>
         <p:nvSpPr>
+          <p:cNvPr id="4" name="Rectangle 3"/>
+          <p:cNvSpPr/>
+          <p:nvPr/>
+        </p:nvSpPr>
+        <p:spPr>
+          <a:xfrm>
+            <a:off x="0" y="1632245"/>
+            <a:ext cx="12192000" cy="1922804"/>
+          </a:xfrm>
+          <a:prstGeom prst="rect">
+            <a:avLst/>
+          </a:prstGeom>
+          <a:solidFill>
+            <a:srgbClr val="7030A0"/>
+          </a:solidFill>
+        </p:spPr>
+        <p:style>
+          <a:lnRef idx="2">
+            <a:schemeClr val="accent1">
+              <a:shade val="50000"/>
+            </a:schemeClr>
+          </a:lnRef>
+          <a:fillRef idx="1">
+            <a:schemeClr val="accent1"/>
+          </a:fillRef>
+          <a:effectRef idx="0">
+            <a:schemeClr val="accent1"/>
+          </a:effectRef>
+          <a:fontRef idx="minor">
+            <a:schemeClr val="lt1"/>
+          </a:fontRef>
+        </p:style>
+        <p:txBody>
+          <a:bodyPr rtlCol="0" anchor="ctr"/>
+          <a:lstStyle/>
+          <a:p>
+            <a:pPr algn="ctr"/>
+            <a:endParaRPr lang="en-US" sz="1100"/>
+          </a:p>
+        </p:txBody>
+      </p:sp>
+      <p:sp>
+        <p:nvSpPr>
+          <p:cNvPr id="2" name="Title 1"/>
+          <p:cNvSpPr>
+            <a:spLocks noGrp="1"/>
+          </p:cNvSpPr>
+          <p:nvPr>
+            <p:ph type="ctrTitle"/>
+          </p:nvPr>
+        </p:nvSpPr>
+        <p:spPr/>
+        <p:txBody>
+          <a:bodyPr/>
+          <a:lstStyle/>
+          <a:p>
+            <a:r>
+              <a:rPr lang="en-US" dirty="0" smtClean="0">
+                <a:solidFill>
+                  <a:schemeClr val="bg1"/>
+                </a:solidFill>
+              </a:rPr>
+              <a:t>PHP advantage and </a:t>
+            </a:r>
+            <a:r>
+              <a:rPr lang="en-US" dirty="0" err="1" smtClean="0">
+                <a:solidFill>
+                  <a:schemeClr val="bg1"/>
+                </a:solidFill>
+              </a:rPr>
+              <a:t>disavantage</a:t>
+            </a:r>
+            <a:endParaRPr lang="en-US" dirty="0">
+              <a:solidFill>
+                <a:schemeClr val="bg1"/>
+              </a:solidFill>
+            </a:endParaRPr>
+          </a:p>
+        </p:txBody>
+      </p:sp>
+      <p:sp>
+        <p:nvSpPr>
+          <p:cNvPr id="3" name="Content Placeholder 2"/>
+          <p:cNvSpPr>
+            <a:spLocks noGrp="1"/>
+          </p:cNvSpPr>
+          <p:nvPr>
+            <p:ph type="subTitle" idx="1"/>
+          </p:nvPr>
+        </p:nvSpPr>
+        <p:spPr/>
+        <p:txBody>
+          <a:bodyPr anchor="ctr">
+            <a:normAutofit/>
+          </a:bodyPr>
+          <a:lstStyle/>
+          <a:p>
+            <a:r>
+              <a:rPr lang="en-US" sz="6600" dirty="0" smtClean="0"/>
+              <a:t>Flexible</a:t>
+            </a:r>
+            <a:endParaRPr lang="en-US" sz="6600" dirty="0"/>
+          </a:p>
+        </p:txBody>
+      </p:sp>
+    </p:spTree>
+    <p:extLst>
+      <p:ext uri="{BB962C8B-B14F-4D97-AF65-F5344CB8AC3E}">
+        <p14:creationId xmlns:p14="http://schemas.microsoft.com/office/powerpoint/2010/main" val="1633288072"/>
+      </p:ext>
+    </p:extLst>
+  </p:cSld>
+  <p:clrMapOvr>
+    <a:masterClrMapping/>
+  </p:clrMapOvr>
+  <p:timing>
+    <p:tnLst>
+      <p:par>
+        <p:cTn id="1" dur="indefinite" restart="never" nodeType="tmRoot"/>
+      </p:par>
+    </p:tnLst>
+  </p:timing>
+</p:sld>
+</file>
+
+<file path=ppt/slides/slide3.xml><?xml version="1.0" encoding="utf-8"?>
+<p:sld xmlns:a="http://schemas.openxmlformats.org/drawingml/2006/main" xmlns:r="http://schemas.openxmlformats.org/officeDocument/2006/relationships" xmlns:p="http://schemas.openxmlformats.org/presentationml/2006/main">
+  <p:cSld>
+    <p:spTree>
+      <p:nvGrpSpPr>
+        <p:cNvPr id="1" name=""/>
+        <p:cNvGrpSpPr/>
+        <p:nvPr/>
+      </p:nvGrpSpPr>
+      <p:grpSpPr>
+        <a:xfrm>
+          <a:off x="0" y="0"/>
+          <a:ext cx="0" cy="0"/>
+          <a:chOff x="0" y="0"/>
+          <a:chExt cx="0" cy="0"/>
+        </a:xfrm>
+      </p:grpSpPr>
+      <p:sp>
+        <p:nvSpPr>
           <p:cNvPr id="2" name="Title 1">
             <a:extLst>
               <a:ext uri="{FF2B5EF4-FFF2-40B4-BE49-F238E27FC236}">
-                <a16:creationId xmlns:a16="http://schemas.microsoft.com/office/drawing/2014/main" id="{192BC89C-36BD-4C8E-A082-83C7F4A7F1DB}"/>
+                <a16:creationId xmlns:a16="http://schemas.microsoft.com/office/drawing/2014/main" xmlns="" id="{192BC89C-36BD-4C8E-A082-83C7F4A7F1DB}"/>
               </a:ext>
             </a:extLst>
           </p:cNvPr>
@@ -7530,6 +8550,10 @@
               <a:rPr lang="zh-CN" altLang="en-US" dirty="0"/>
               <a:t>客户端 </a:t>
             </a:r>
+            <a:r>
+              <a:rPr lang="en-MY" altLang="zh-CN" dirty="0"/>
+              <a:t/>
+            </a:r>
             <a:br>
               <a:rPr lang="en-MY" altLang="zh-CN" dirty="0"/>
             </a:br>
@@ -7545,7 +8569,7 @@
           <p:cNvPr id="5" name="Content Placeholder 4">
             <a:extLst>
               <a:ext uri="{FF2B5EF4-FFF2-40B4-BE49-F238E27FC236}">
-                <a16:creationId xmlns:a16="http://schemas.microsoft.com/office/drawing/2014/main" id="{21B7DDBA-0DE6-4A84-97FD-9D39434D8360}"/>
+                <a16:creationId xmlns:a16="http://schemas.microsoft.com/office/drawing/2014/main" xmlns="" id="{21B7DDBA-0DE6-4A84-97FD-9D39434D8360}"/>
               </a:ext>
             </a:extLst>
           </p:cNvPr>
@@ -7585,158 +8609,13 @@
   <p:clrMapOvr>
     <a:masterClrMapping/>
   </p:clrMapOvr>
-</p:sld>
-</file>
-
-<file path=ppt/slides/slide3.xml><?xml version="1.0" encoding="utf-8"?>
-<p:sld xmlns:a="http://schemas.openxmlformats.org/drawingml/2006/main" xmlns:r="http://schemas.openxmlformats.org/officeDocument/2006/relationships" xmlns:p="http://schemas.openxmlformats.org/presentationml/2006/main">
-  <p:cSld>
-    <p:spTree>
-      <p:nvGrpSpPr>
-        <p:cNvPr id="1" name=""/>
-        <p:cNvGrpSpPr/>
-        <p:nvPr/>
-      </p:nvGrpSpPr>
-      <p:grpSpPr>
-        <a:xfrm>
-          <a:off x="0" y="0"/>
-          <a:ext cx="0" cy="0"/>
-          <a:chOff x="0" y="0"/>
-          <a:chExt cx="0" cy="0"/>
-        </a:xfrm>
-      </p:grpSpPr>
-      <p:sp>
-        <p:nvSpPr>
-          <p:cNvPr id="2" name="Title 1">
-            <a:extLst>
-              <a:ext uri="{FF2B5EF4-FFF2-40B4-BE49-F238E27FC236}">
-                <a16:creationId xmlns:a16="http://schemas.microsoft.com/office/drawing/2014/main" id="{BCACC300-5004-41B5-B8DD-26271AFD5421}"/>
-              </a:ext>
-            </a:extLst>
-          </p:cNvPr>
-          <p:cNvSpPr>
-            <a:spLocks noGrp="1"/>
-          </p:cNvSpPr>
-          <p:nvPr>
-            <p:ph type="title"/>
-          </p:nvPr>
-        </p:nvSpPr>
-        <p:spPr/>
-        <p:txBody>
-          <a:bodyPr/>
-          <a:lstStyle/>
-          <a:p>
-            <a:r>
-              <a:rPr lang="en-US" altLang="zh-CN" dirty="0"/>
-              <a:t>Chapter 1: Syntax</a:t>
-            </a:r>
-            <a:endParaRPr lang="en-MY" dirty="0"/>
-          </a:p>
-        </p:txBody>
-      </p:sp>
-      <p:sp>
-        <p:nvSpPr>
-          <p:cNvPr id="3" name="Content Placeholder 2">
-            <a:extLst>
-              <a:ext uri="{FF2B5EF4-FFF2-40B4-BE49-F238E27FC236}">
-                <a16:creationId xmlns:a16="http://schemas.microsoft.com/office/drawing/2014/main" id="{3195A3AD-FECC-4F87-93B5-B2CD82204AFE}"/>
-              </a:ext>
-            </a:extLst>
-          </p:cNvPr>
-          <p:cNvSpPr>
-            <a:spLocks noGrp="1"/>
-          </p:cNvSpPr>
-          <p:nvPr>
-            <p:ph idx="1"/>
-          </p:nvPr>
-        </p:nvSpPr>
-        <p:spPr/>
-        <p:txBody>
-          <a:bodyPr/>
-          <a:lstStyle/>
-          <a:p>
-            <a:r>
-              <a:rPr lang="en-MY" altLang="zh-CN" dirty="0"/>
-              <a:t>Comment </a:t>
-            </a:r>
-            <a:r>
-              <a:rPr lang="zh-CN" altLang="en-US" dirty="0"/>
-              <a:t>注释</a:t>
-            </a:r>
-          </a:p>
-          <a:p>
-            <a:r>
-              <a:rPr lang="en-MY" altLang="zh-CN" dirty="0"/>
-              <a:t>Variable </a:t>
-            </a:r>
-            <a:r>
-              <a:rPr lang="zh-CN" altLang="en-US" dirty="0"/>
-              <a:t>变数</a:t>
-            </a:r>
-          </a:p>
-          <a:p>
-            <a:r>
-              <a:rPr lang="en-MY" altLang="zh-CN" dirty="0"/>
-              <a:t>String </a:t>
-            </a:r>
-            <a:r>
-              <a:rPr lang="zh-CN" altLang="en-US" dirty="0"/>
-              <a:t>字串</a:t>
-            </a:r>
-          </a:p>
-          <a:p>
-            <a:r>
-              <a:rPr lang="en-MY" altLang="zh-CN" dirty="0"/>
-              <a:t>Concatenated string </a:t>
-            </a:r>
-            <a:r>
-              <a:rPr lang="zh-CN" altLang="en-US" dirty="0"/>
-              <a:t>串联字串</a:t>
-            </a:r>
-          </a:p>
-          <a:p>
-            <a:r>
-              <a:rPr lang="en-MY" altLang="zh-CN" dirty="0"/>
-              <a:t>Integer </a:t>
-            </a:r>
-            <a:r>
-              <a:rPr lang="zh-CN" altLang="en-US" dirty="0"/>
-              <a:t>数字</a:t>
-            </a:r>
-          </a:p>
-          <a:p>
-            <a:r>
-              <a:rPr lang="en-MY" altLang="zh-CN" dirty="0"/>
-              <a:t>Operator </a:t>
-            </a:r>
-            <a:r>
-              <a:rPr lang="zh-CN" altLang="en-US" dirty="0"/>
-              <a:t>运算符</a:t>
-            </a:r>
-          </a:p>
-          <a:p>
-            <a:r>
-              <a:rPr lang="en-MY" altLang="zh-CN" dirty="0"/>
-              <a:t>Constant </a:t>
-            </a:r>
-            <a:r>
-              <a:rPr lang="zh-CN" altLang="en-US" dirty="0"/>
-              <a:t>固定值</a:t>
-            </a:r>
-            <a:endParaRPr lang="en-MY" dirty="0"/>
-          </a:p>
-        </p:txBody>
-      </p:sp>
-    </p:spTree>
-    <p:extLst>
-      <p:ext uri="{BB962C8B-B14F-4D97-AF65-F5344CB8AC3E}">
-        <p14:creationId xmlns:p14="http://schemas.microsoft.com/office/powerpoint/2010/main" val="1692747324"/>
-      </p:ext>
-    </p:extLst>
-  </p:cSld>
-  <p:clrMapOvr>
-    <a:masterClrMapping/>
-  </p:clrMapOvr>
+  <p:timing>
+    <p:tnLst>
+      <p:par>
+        <p:cTn id="1" dur="indefinite" restart="never" nodeType="tmRoot"/>
+      </p:par>
+    </p:tnLst>
+  </p:timing>
 </p:sld>
 </file>
 
@@ -7762,7 +8641,7 @@
           <p:cNvPr id="2" name="Title 1">
             <a:extLst>
               <a:ext uri="{FF2B5EF4-FFF2-40B4-BE49-F238E27FC236}">
-                <a16:creationId xmlns:a16="http://schemas.microsoft.com/office/drawing/2014/main" id="{140B217C-17D3-46DB-94ED-7CF5C2C15200}"/>
+                <a16:creationId xmlns:a16="http://schemas.microsoft.com/office/drawing/2014/main" xmlns="" id="{BCACC300-5004-41B5-B8DD-26271AFD5421}"/>
               </a:ext>
             </a:extLst>
           </p:cNvPr>
@@ -7779,17 +8658,22 @@
           <a:lstStyle/>
           <a:p>
             <a:r>
-              <a:rPr lang="en-MY" dirty="0"/>
-              <a:t>Chapter 2: </a:t>
-            </a:r>
-            <a:r>
               <a:rPr lang="en-US" altLang="zh-CN" dirty="0"/>
-              <a:t>Syntax</a:t>
-            </a:r>
-            <a:r>
-              <a:rPr lang="en-MY" dirty="0"/>
+              <a:t>Chapter 1: </a:t>
+            </a:r>
+            <a:r>
+              <a:rPr lang="en-US" altLang="zh-CN" dirty="0" smtClean="0"/>
+              <a:t>Syntax +</a:t>
+            </a:r>
+            <a:r>
+              <a:rPr lang="zh-CN" altLang="en-US" dirty="0" smtClean="0"/>
               <a:t> </a:t>
             </a:r>
+            <a:r>
+              <a:rPr lang="en-US" altLang="zh-CN" dirty="0" smtClean="0"/>
+              <a:t>Data type</a:t>
+            </a:r>
+            <a:endParaRPr lang="en-MY" dirty="0"/>
           </a:p>
         </p:txBody>
       </p:sp>
@@ -7798,7 +8682,7 @@
           <p:cNvPr id="3" name="Content Placeholder 2">
             <a:extLst>
               <a:ext uri="{FF2B5EF4-FFF2-40B4-BE49-F238E27FC236}">
-                <a16:creationId xmlns:a16="http://schemas.microsoft.com/office/drawing/2014/main" id="{ACCC36CA-F391-4723-9EC6-B8268BB26A39}"/>
+                <a16:creationId xmlns:a16="http://schemas.microsoft.com/office/drawing/2014/main" xmlns="" id="{3195A3AD-FECC-4F87-93B5-B2CD82204AFE}"/>
               </a:ext>
             </a:extLst>
           </p:cNvPr>
@@ -7815,42 +8699,106 @@
           <a:lstStyle/>
           <a:p>
             <a:r>
-              <a:rPr lang="en-MY" dirty="0"/>
-              <a:t>Comparison operators </a:t>
+              <a:rPr lang="en-MY" altLang="zh-CN" dirty="0"/>
+              <a:t>Comment </a:t>
             </a:r>
             <a:r>
               <a:rPr lang="zh-CN" altLang="en-US" dirty="0"/>
-              <a:t>比较运算符</a:t>
-            </a:r>
-          </a:p>
-          <a:p>
-            <a:r>
-              <a:rPr lang="en-MY" dirty="0"/>
-              <a:t>Function </a:t>
+              <a:t>注释</a:t>
+            </a:r>
+          </a:p>
+          <a:p>
+            <a:r>
+              <a:rPr lang="en-MY" altLang="zh-CN" dirty="0"/>
+              <a:t>Variable </a:t>
             </a:r>
             <a:r>
               <a:rPr lang="zh-CN" altLang="en-US" dirty="0"/>
-              <a:t>函数</a:t>
-            </a:r>
-          </a:p>
-          <a:p>
-            <a:r>
-              <a:rPr lang="en-MY" dirty="0"/>
-              <a:t>Array </a:t>
+              <a:t>变</a:t>
+            </a:r>
+            <a:r>
+              <a:rPr lang="zh-CN" altLang="en-US" dirty="0" smtClean="0"/>
+              <a:t>数 </a:t>
+            </a:r>
+            <a:r>
+              <a:rPr lang="en-US" altLang="zh-CN" dirty="0" smtClean="0"/>
+              <a:t>+</a:t>
+            </a:r>
+            <a:r>
+              <a:rPr lang="zh-CN" altLang="en-US" dirty="0" smtClean="0"/>
+              <a:t> </a:t>
+            </a:r>
+            <a:r>
+              <a:rPr lang="en-US" altLang="zh-CN" dirty="0" smtClean="0"/>
+              <a:t>variable scope</a:t>
+            </a:r>
+            <a:endParaRPr lang="zh-CN" altLang="en-US" dirty="0"/>
+          </a:p>
+          <a:p>
+            <a:r>
+              <a:rPr lang="en-MY" altLang="zh-CN" dirty="0"/>
+              <a:t>String </a:t>
             </a:r>
             <a:r>
               <a:rPr lang="zh-CN" altLang="en-US" dirty="0"/>
-              <a:t>阵列</a:t>
-            </a:r>
-          </a:p>
-          <a:p>
-            <a:r>
-              <a:rPr lang="en-MY" dirty="0"/>
-              <a:t>Foreach loop </a:t>
+              <a:t>字</a:t>
+            </a:r>
+            <a:r>
+              <a:rPr lang="zh-CN" altLang="en-US" dirty="0" smtClean="0"/>
+              <a:t>串（单引号 </a:t>
+            </a:r>
+            <a:r>
+              <a:rPr lang="en-US" altLang="zh-CN" dirty="0" err="1" smtClean="0"/>
+              <a:t>vs</a:t>
+            </a:r>
+            <a:r>
+              <a:rPr lang="en-US" altLang="zh-CN" dirty="0" smtClean="0"/>
+              <a:t> </a:t>
+            </a:r>
+            <a:r>
+              <a:rPr lang="zh-CN" altLang="en-US" dirty="0" smtClean="0"/>
+              <a:t>双引号）</a:t>
+            </a:r>
+            <a:endParaRPr lang="zh-CN" altLang="en-US" dirty="0"/>
+          </a:p>
+          <a:p>
+            <a:r>
+              <a:rPr lang="en-MY" altLang="zh-CN" dirty="0"/>
+              <a:t>Concatenated string </a:t>
             </a:r>
             <a:r>
               <a:rPr lang="zh-CN" altLang="en-US" dirty="0"/>
-              <a:t>循环</a:t>
+              <a:t>串联字串</a:t>
+            </a:r>
+          </a:p>
+          <a:p>
+            <a:r>
+              <a:rPr lang="en-MY" altLang="zh-CN" dirty="0"/>
+              <a:t>Integer </a:t>
+            </a:r>
+            <a:r>
+              <a:rPr lang="zh-CN" altLang="en-US" dirty="0"/>
+              <a:t>数字</a:t>
+            </a:r>
+          </a:p>
+          <a:p>
+            <a:r>
+              <a:rPr lang="en-MY" altLang="zh-CN" dirty="0"/>
+              <a:t>Operator </a:t>
+            </a:r>
+            <a:r>
+              <a:rPr lang="zh-CN" altLang="en-US" dirty="0"/>
+              <a:t>运算符</a:t>
+            </a:r>
+          </a:p>
+          <a:p>
+            <a:r>
+              <a:rPr lang="en-MY" altLang="zh-CN" dirty="0"/>
+              <a:t>Constant </a:t>
+            </a:r>
+            <a:r>
+              <a:rPr lang="zh-CN" altLang="en-US" dirty="0"/>
+              <a:t>固定值</a:t>
             </a:r>
             <a:endParaRPr lang="en-MY" dirty="0"/>
           </a:p>
@@ -7859,13 +8807,20 @@
     </p:spTree>
     <p:extLst>
       <p:ext uri="{BB962C8B-B14F-4D97-AF65-F5344CB8AC3E}">
-        <p14:creationId xmlns:p14="http://schemas.microsoft.com/office/powerpoint/2010/main" val="911081760"/>
+        <p14:creationId xmlns:p14="http://schemas.microsoft.com/office/powerpoint/2010/main" val="1692747324"/>
       </p:ext>
     </p:extLst>
   </p:cSld>
   <p:clrMapOvr>
     <a:masterClrMapping/>
   </p:clrMapOvr>
+  <p:timing>
+    <p:tnLst>
+      <p:par>
+        <p:cTn id="1" dur="indefinite" restart="never" nodeType="tmRoot"/>
+      </p:par>
+    </p:tnLst>
+  </p:timing>
 </p:sld>
 </file>
 
@@ -7891,7 +8846,7 @@
           <p:cNvPr id="2" name="Title 1">
             <a:extLst>
               <a:ext uri="{FF2B5EF4-FFF2-40B4-BE49-F238E27FC236}">
-                <a16:creationId xmlns:a16="http://schemas.microsoft.com/office/drawing/2014/main" id="{3A085279-E93D-4FA7-9680-045E0E959A9E}"/>
+                <a16:creationId xmlns:a16="http://schemas.microsoft.com/office/drawing/2014/main" xmlns="" id="{140B217C-17D3-46DB-94ED-7CF5C2C15200}"/>
               </a:ext>
             </a:extLst>
           </p:cNvPr>
@@ -7908,13 +8863,26 @@
           <a:lstStyle/>
           <a:p>
             <a:r>
-              <a:rPr lang="zh-CN" altLang="en-US" b="1" dirty="0"/>
-              <a:t>强弱类型 </a:t>
-            </a:r>
-            <a:r>
               <a:rPr lang="en-MY" dirty="0"/>
-              <a:t>Strong typed VS Weak typed</a:t>
-            </a:r>
+              <a:t>Chapter 2: </a:t>
+            </a:r>
+            <a:r>
+              <a:rPr lang="en-US" altLang="zh-CN" dirty="0"/>
+              <a:t>Syntax +</a:t>
+            </a:r>
+            <a:r>
+              <a:rPr lang="zh-CN" altLang="en-US" dirty="0"/>
+              <a:t> </a:t>
+            </a:r>
+            <a:r>
+              <a:rPr lang="en-US" altLang="zh-CN" dirty="0"/>
+              <a:t>Data type</a:t>
+            </a:r>
+            <a:r>
+              <a:rPr lang="en-MY" dirty="0" smtClean="0"/>
+              <a:t> </a:t>
+            </a:r>
+            <a:endParaRPr lang="en-MY" dirty="0"/>
           </a:p>
         </p:txBody>
       </p:sp>
@@ -7923,7 +8891,7 @@
           <p:cNvPr id="3" name="Content Placeholder 2">
             <a:extLst>
               <a:ext uri="{FF2B5EF4-FFF2-40B4-BE49-F238E27FC236}">
-                <a16:creationId xmlns:a16="http://schemas.microsoft.com/office/drawing/2014/main" id="{74C3AA1B-FBC7-4705-B2B4-C07598AD4EF0}"/>
+                <a16:creationId xmlns:a16="http://schemas.microsoft.com/office/drawing/2014/main" xmlns="" id="{ACCC36CA-F391-4723-9EC6-B8268BB26A39}"/>
               </a:ext>
             </a:extLst>
           </p:cNvPr>
@@ -7939,6 +8907,59 @@
           <a:bodyPr/>
           <a:lstStyle/>
           <a:p>
+            <a:r>
+              <a:rPr lang="en-MY" dirty="0"/>
+              <a:t>Comparison operators </a:t>
+            </a:r>
+            <a:r>
+              <a:rPr lang="zh-CN" altLang="en-US" dirty="0"/>
+              <a:t>比较运算符</a:t>
+            </a:r>
+          </a:p>
+          <a:p>
+            <a:r>
+              <a:rPr lang="en-MY" dirty="0"/>
+              <a:t>Function </a:t>
+            </a:r>
+            <a:r>
+              <a:rPr lang="zh-CN" altLang="en-US" dirty="0"/>
+              <a:t>函数</a:t>
+            </a:r>
+          </a:p>
+          <a:p>
+            <a:r>
+              <a:rPr lang="en-MY" dirty="0"/>
+              <a:t>Array </a:t>
+            </a:r>
+            <a:r>
+              <a:rPr lang="zh-CN" altLang="en-US" dirty="0"/>
+              <a:t>阵列</a:t>
+            </a:r>
+          </a:p>
+          <a:p>
+            <a:r>
+              <a:rPr lang="en-MY" dirty="0"/>
+              <a:t>Foreach loop </a:t>
+            </a:r>
+            <a:r>
+              <a:rPr lang="zh-CN" altLang="en-US" dirty="0"/>
+              <a:t>循</a:t>
+            </a:r>
+            <a:r>
+              <a:rPr lang="zh-CN" altLang="en-US" dirty="0" smtClean="0"/>
+              <a:t>环</a:t>
+            </a:r>
+            <a:endParaRPr lang="en-US" altLang="zh-CN" dirty="0" smtClean="0"/>
+          </a:p>
+          <a:p>
+            <a:r>
+              <a:rPr lang="en-US" dirty="0" smtClean="0"/>
+              <a:t>Namespace </a:t>
+            </a:r>
+            <a:r>
+              <a:rPr lang="zh-CN" altLang="en-US" dirty="0"/>
+              <a:t>命名空间</a:t>
+            </a:r>
             <a:endParaRPr lang="en-MY" dirty="0"/>
           </a:p>
         </p:txBody>
@@ -7946,7 +8967,7 @@
     </p:spTree>
     <p:extLst>
       <p:ext uri="{BB962C8B-B14F-4D97-AF65-F5344CB8AC3E}">
-        <p14:creationId xmlns:p14="http://schemas.microsoft.com/office/powerpoint/2010/main" val="3911617530"/>
+        <p14:creationId xmlns:p14="http://schemas.microsoft.com/office/powerpoint/2010/main" val="911081760"/>
       </p:ext>
     </p:extLst>
   </p:cSld>
@@ -7978,7 +8999,7 @@
           <p:cNvPr id="2" name="Title 1">
             <a:extLst>
               <a:ext uri="{FF2B5EF4-FFF2-40B4-BE49-F238E27FC236}">
-                <a16:creationId xmlns:a16="http://schemas.microsoft.com/office/drawing/2014/main" id="{E4C15D0D-AA12-493C-BB75-C2A108AAD9B7}"/>
+                <a16:creationId xmlns:a16="http://schemas.microsoft.com/office/drawing/2014/main" xmlns="" id="{3A085279-E93D-4FA7-9680-045E0E959A9E}"/>
               </a:ext>
             </a:extLst>
           </p:cNvPr>
@@ -7995,14 +9016,13 @@
           <a:lstStyle/>
           <a:p>
             <a:r>
-              <a:rPr lang="en-US" altLang="zh-CN" dirty="0"/>
-              <a:t>PHP </a:t>
-            </a:r>
-            <a:r>
-              <a:rPr lang="zh-CN" altLang="en-US" dirty="0"/>
-              <a:t>表格</a:t>
-            </a:r>
-            <a:endParaRPr lang="en-MY" dirty="0"/>
+              <a:rPr lang="zh-CN" altLang="en-US" b="1" dirty="0"/>
+              <a:t>强弱类型 </a:t>
+            </a:r>
+            <a:r>
+              <a:rPr lang="en-MY" dirty="0"/>
+              <a:t>Strong typed VS Weak typed</a:t>
+            </a:r>
           </a:p>
         </p:txBody>
       </p:sp>
@@ -8011,7 +9031,7 @@
           <p:cNvPr id="3" name="Content Placeholder 2">
             <a:extLst>
               <a:ext uri="{FF2B5EF4-FFF2-40B4-BE49-F238E27FC236}">
-                <a16:creationId xmlns:a16="http://schemas.microsoft.com/office/drawing/2014/main" id="{FDCE3AB8-B59A-444D-B8DB-3CE02B5F4F4F}"/>
+                <a16:creationId xmlns:a16="http://schemas.microsoft.com/office/drawing/2014/main" xmlns="" id="{74C3AA1B-FBC7-4705-B2B4-C07598AD4EF0}"/>
               </a:ext>
             </a:extLst>
           </p:cNvPr>
@@ -8027,6 +9047,74 @@
           <a:bodyPr/>
           <a:lstStyle/>
           <a:p>
+            <a:r>
+              <a:rPr lang="en-MY" dirty="0" smtClean="0"/>
+              <a:t>0 == </a:t>
+            </a:r>
+            <a:r>
+              <a:rPr lang="en-US" dirty="0" smtClean="0"/>
+              <a:t>‘’</a:t>
+            </a:r>
+          </a:p>
+          <a:p>
+            <a:r>
+              <a:rPr lang="en-US" dirty="0" smtClean="0"/>
+              <a:t>1 != ‘</a:t>
+            </a:r>
+            <a:r>
+              <a:rPr lang="en-US" dirty="0" err="1" smtClean="0"/>
+              <a:t>abc</a:t>
+            </a:r>
+            <a:r>
+              <a:rPr lang="en-US" dirty="0" smtClean="0"/>
+              <a:t>’</a:t>
+            </a:r>
+          </a:p>
+          <a:p>
+            <a:r>
+              <a:rPr lang="en-MY" dirty="0"/>
+              <a:t>t</a:t>
+            </a:r>
+            <a:r>
+              <a:rPr lang="en-MY" dirty="0" smtClean="0"/>
+              <a:t>rue == ‘</a:t>
+            </a:r>
+            <a:r>
+              <a:rPr lang="en-MY" dirty="0" err="1" smtClean="0"/>
+              <a:t>abc</a:t>
+            </a:r>
+            <a:r>
+              <a:rPr lang="en-MY" dirty="0" smtClean="0"/>
+              <a:t>’</a:t>
+            </a:r>
+          </a:p>
+          <a:p>
+            <a:r>
+              <a:rPr lang="en-MY" dirty="0" smtClean="0"/>
+              <a:t>empty(‘0’) == </a:t>
+            </a:r>
+            <a:r>
+              <a:rPr lang="en-US" altLang="zh-CN" dirty="0" smtClean="0"/>
+              <a:t>true</a:t>
+            </a:r>
+          </a:p>
+          <a:p>
+            <a:r>
+              <a:rPr lang="en-MY" dirty="0"/>
+              <a:t>empty</a:t>
+            </a:r>
+            <a:r>
+              <a:rPr lang="en-MY" dirty="0" smtClean="0"/>
+              <a:t>(‘ ’) == false </a:t>
+            </a:r>
+            <a:r>
+              <a:rPr lang="zh-CN" altLang="en-US" dirty="0" smtClean="0"/>
+              <a:t>（因为引号中间有空格）</a:t>
+            </a:r>
+            <a:r>
+              <a:rPr lang="en-MY" dirty="0" smtClean="0"/>
+              <a:t> </a:t>
+            </a:r>
             <a:endParaRPr lang="en-MY" dirty="0"/>
           </a:p>
         </p:txBody>
@@ -8034,7 +9122,7 @@
     </p:spTree>
     <p:extLst>
       <p:ext uri="{BB962C8B-B14F-4D97-AF65-F5344CB8AC3E}">
-        <p14:creationId xmlns:p14="http://schemas.microsoft.com/office/powerpoint/2010/main" val="3318002880"/>
+        <p14:creationId xmlns:p14="http://schemas.microsoft.com/office/powerpoint/2010/main" val="3911617530"/>
       </p:ext>
     </p:extLst>
   </p:cSld>
@@ -8066,7 +9154,7 @@
           <p:cNvPr id="2" name="Title 1">
             <a:extLst>
               <a:ext uri="{FF2B5EF4-FFF2-40B4-BE49-F238E27FC236}">
-                <a16:creationId xmlns:a16="http://schemas.microsoft.com/office/drawing/2014/main" id="{E224C506-B652-4723-BC3D-2C1BB7828195}"/>
+                <a16:creationId xmlns:a16="http://schemas.microsoft.com/office/drawing/2014/main" xmlns="" id="{E4C15D0D-AA12-493C-BB75-C2A108AAD9B7}"/>
               </a:ext>
             </a:extLst>
           </p:cNvPr>
@@ -8083,12 +9171,12 @@
           <a:lstStyle/>
           <a:p>
             <a:r>
-              <a:rPr lang="en-MY" dirty="0"/>
-              <a:t>PHP </a:t>
+              <a:rPr lang="en-US" altLang="zh-CN" dirty="0" smtClean="0"/>
+              <a:t>Chapter 4: PHP </a:t>
             </a:r>
             <a:r>
               <a:rPr lang="zh-CN" altLang="en-US" dirty="0"/>
-              <a:t>特别变数</a:t>
+              <a:t>表格</a:t>
             </a:r>
             <a:endParaRPr lang="en-MY" dirty="0"/>
           </a:p>
@@ -8099,7 +9187,7 @@
           <p:cNvPr id="3" name="Content Placeholder 2">
             <a:extLst>
               <a:ext uri="{FF2B5EF4-FFF2-40B4-BE49-F238E27FC236}">
-                <a16:creationId xmlns:a16="http://schemas.microsoft.com/office/drawing/2014/main" id="{1A7F3B39-DBC5-435A-B004-55EF84133A14}"/>
+                <a16:creationId xmlns:a16="http://schemas.microsoft.com/office/drawing/2014/main" xmlns="" id="{FDCE3AB8-B59A-444D-B8DB-3CE02B5F4F4F}"/>
               </a:ext>
             </a:extLst>
           </p:cNvPr>
@@ -8112,22 +9200,8 @@
         </p:nvSpPr>
         <p:spPr/>
         <p:txBody>
-          <a:bodyPr>
-            <a:normAutofit lnSpcReduction="10000"/>
-          </a:bodyPr>
+          <a:bodyPr/>
           <a:lstStyle/>
-          <a:p>
-            <a:r>
-              <a:rPr lang="en-MY" dirty="0"/>
-              <a:t>$GLOBALS</a:t>
-            </a:r>
-          </a:p>
-          <a:p>
-            <a:r>
-              <a:rPr lang="en-MY" dirty="0"/>
-              <a:t>$_SERVER</a:t>
-            </a:r>
-          </a:p>
           <a:p>
             <a:r>
               <a:rPr lang="en-MY" b="1" dirty="0">
@@ -8165,7 +9239,7 @@
               </a:lnSpc>
             </a:pPr>
             <a:r>
-              <a:rPr lang="en-MY" b="1" dirty="0">
+              <a:rPr lang="en-MY" b="1">
                 <a:solidFill>
                   <a:srgbClr val="C00000"/>
                 </a:solidFill>
@@ -8174,32 +9248,6 @@
             </a:r>
           </a:p>
           <a:p>
-            <a:r>
-              <a:rPr lang="en-MY" dirty="0"/>
-              <a:t>$_ENV</a:t>
-            </a:r>
-          </a:p>
-          <a:p>
-            <a:r>
-              <a:rPr lang="en-MY" b="1" dirty="0">
-                <a:solidFill>
-                  <a:srgbClr val="C00000"/>
-                </a:solidFill>
-              </a:rPr>
-              <a:t>$_COOKIE</a:t>
-            </a:r>
-          </a:p>
-          <a:p>
-            <a:r>
-              <a:rPr lang="en-MY" b="1" dirty="0">
-                <a:solidFill>
-                  <a:srgbClr val="C00000"/>
-                </a:solidFill>
-              </a:rPr>
-              <a:t>$_SESSION</a:t>
-            </a:r>
-          </a:p>
-          <a:p>
             <a:endParaRPr lang="en-MY" dirty="0"/>
           </a:p>
         </p:txBody>
@@ -8207,7 +9255,7 @@
     </p:spTree>
     <p:extLst>
       <p:ext uri="{BB962C8B-B14F-4D97-AF65-F5344CB8AC3E}">
-        <p14:creationId xmlns:p14="http://schemas.microsoft.com/office/powerpoint/2010/main" val="3233933867"/>
+        <p14:creationId xmlns:p14="http://schemas.microsoft.com/office/powerpoint/2010/main" val="3318002880"/>
       </p:ext>
     </p:extLst>
   </p:cSld>
@@ -8239,7 +9287,7 @@
           <p:cNvPr id="2" name="Title 1">
             <a:extLst>
               <a:ext uri="{FF2B5EF4-FFF2-40B4-BE49-F238E27FC236}">
-                <a16:creationId xmlns:a16="http://schemas.microsoft.com/office/drawing/2014/main" id="{A11D285D-4F11-491A-8CF9-9AA92130D3A8}"/>
+                <a16:creationId xmlns:a16="http://schemas.microsoft.com/office/drawing/2014/main" xmlns="" id="{E224C506-B652-4723-BC3D-2C1BB7828195}"/>
               </a:ext>
             </a:extLst>
           </p:cNvPr>
@@ -8256,16 +9304,12 @@
           <a:lstStyle/>
           <a:p>
             <a:r>
+              <a:rPr lang="en-MY" dirty="0"/>
+              <a:t>PHP </a:t>
+            </a:r>
+            <a:r>
               <a:rPr lang="zh-CN" altLang="en-US" dirty="0"/>
-              <a:t>复习 </a:t>
-            </a:r>
-            <a:r>
-              <a:rPr lang="en-US" altLang="zh-CN" dirty="0"/>
-              <a:t>/ </a:t>
-            </a:r>
-            <a:r>
-              <a:rPr lang="zh-CN" altLang="en-US" dirty="0"/>
-              <a:t>练习</a:t>
+              <a:t>特别变数</a:t>
             </a:r>
             <a:endParaRPr lang="en-MY" dirty="0"/>
           </a:p>
@@ -8276,7 +9320,7 @@
           <p:cNvPr id="3" name="Content Placeholder 2">
             <a:extLst>
               <a:ext uri="{FF2B5EF4-FFF2-40B4-BE49-F238E27FC236}">
-                <a16:creationId xmlns:a16="http://schemas.microsoft.com/office/drawing/2014/main" id="{106F9E10-F07F-41CB-A0B9-D7DD51AEB422}"/>
+                <a16:creationId xmlns:a16="http://schemas.microsoft.com/office/drawing/2014/main" xmlns="" id="{1A7F3B39-DBC5-435A-B004-55EF84133A14}"/>
               </a:ext>
             </a:extLst>
           </p:cNvPr>
@@ -8289,24 +9333,94 @@
         </p:nvSpPr>
         <p:spPr/>
         <p:txBody>
-          <a:bodyPr/>
+          <a:bodyPr>
+            <a:normAutofit lnSpcReduction="10000"/>
+          </a:bodyPr>
           <a:lstStyle/>
           <a:p>
             <a:r>
-              <a:rPr lang="en-MY" dirty="0">
-                <a:hlinkClick r:id="rId2"/>
+              <a:rPr lang="en-MY" dirty="0"/>
+              <a:t>$GLOBALS</a:t>
+            </a:r>
+          </a:p>
+          <a:p>
+            <a:r>
+              <a:rPr lang="en-MY" dirty="0"/>
+              <a:t>$_SERVER</a:t>
+            </a:r>
+          </a:p>
+          <a:p>
+            <a:r>
+              <a:rPr lang="en-MY" b="1" dirty="0">
+                <a:solidFill>
+                  <a:srgbClr val="C00000"/>
+                </a:solidFill>
               </a:rPr>
-              <a:t>https://www.w3schools.com/php</a:t>
-            </a:r>
-            <a:endParaRPr lang="en-MY" dirty="0"/>
-          </a:p>
-          <a:p>
-            <a:r>
-              <a:rPr lang="en-MY" dirty="0">
-                <a:hlinkClick r:id="rId3"/>
+              <a:t>$_REQUEST</a:t>
+            </a:r>
+          </a:p>
+          <a:p>
+            <a:r>
+              <a:rPr lang="en-MY" b="1" dirty="0">
+                <a:solidFill>
+                  <a:srgbClr val="C00000"/>
+                </a:solidFill>
               </a:rPr>
-              <a:t>https://www.codecademy.com/courses/learn-php</a:t>
-            </a:r>
+              <a:t>$_POST</a:t>
+            </a:r>
+          </a:p>
+          <a:p>
+            <a:r>
+              <a:rPr lang="en-MY" b="1" dirty="0">
+                <a:solidFill>
+                  <a:srgbClr val="C00000"/>
+                </a:solidFill>
+              </a:rPr>
+              <a:t>$_GET</a:t>
+            </a:r>
+          </a:p>
+          <a:p>
+            <a:pPr>
+              <a:lnSpc>
+                <a:spcPct val="100000"/>
+              </a:lnSpc>
+            </a:pPr>
+            <a:r>
+              <a:rPr lang="en-MY" b="1" dirty="0">
+                <a:solidFill>
+                  <a:srgbClr val="C00000"/>
+                </a:solidFill>
+              </a:rPr>
+              <a:t>$_FILES</a:t>
+            </a:r>
+          </a:p>
+          <a:p>
+            <a:r>
+              <a:rPr lang="en-MY" dirty="0"/>
+              <a:t>$_ENV</a:t>
+            </a:r>
+          </a:p>
+          <a:p>
+            <a:r>
+              <a:rPr lang="en-MY" b="1" dirty="0">
+                <a:solidFill>
+                  <a:srgbClr val="C00000"/>
+                </a:solidFill>
+              </a:rPr>
+              <a:t>$_COOKIE</a:t>
+            </a:r>
+          </a:p>
+          <a:p>
+            <a:r>
+              <a:rPr lang="en-MY" b="1" dirty="0">
+                <a:solidFill>
+                  <a:srgbClr val="C00000"/>
+                </a:solidFill>
+              </a:rPr>
+              <a:t>$_SESSION</a:t>
+            </a:r>
+          </a:p>
+          <a:p>
             <a:endParaRPr lang="en-MY" dirty="0"/>
           </a:p>
         </p:txBody>
@@ -8314,7 +9428,7 @@
     </p:spTree>
     <p:extLst>
       <p:ext uri="{BB962C8B-B14F-4D97-AF65-F5344CB8AC3E}">
-        <p14:creationId xmlns:p14="http://schemas.microsoft.com/office/powerpoint/2010/main" val="1701367885"/>
+        <p14:creationId xmlns:p14="http://schemas.microsoft.com/office/powerpoint/2010/main" val="3233933867"/>
       </p:ext>
     </p:extLst>
   </p:cSld>
@@ -8343,13 +9457,7 @@
       </p:grpSpPr>
       <p:sp>
         <p:nvSpPr>
-          <p:cNvPr id="2" name="Title 1">
-            <a:extLst>
-              <a:ext uri="{FF2B5EF4-FFF2-40B4-BE49-F238E27FC236}">
-                <a16:creationId xmlns:a16="http://schemas.microsoft.com/office/drawing/2014/main" id="{1487C1F5-F0F7-4AD6-8B3A-7B9B9A82DC89}"/>
-              </a:ext>
-            </a:extLst>
-          </p:cNvPr>
+          <p:cNvPr id="2" name="Title 1"/>
           <p:cNvSpPr>
             <a:spLocks noGrp="1"/>
           </p:cNvSpPr>
@@ -8363,125 +9471,44 @@
           <a:lstStyle/>
           <a:p>
             <a:r>
-              <a:rPr lang="en-MY" dirty="0"/>
-              <a:t>Chapter 7: </a:t>
-            </a:r>
-            <a:r>
-              <a:rPr lang="zh-CN" altLang="en-US" dirty="0"/>
-              <a:t>简易</a:t>
-            </a:r>
-            <a:r>
-              <a:rPr lang="en-MY" dirty="0"/>
-              <a:t> MVC</a:t>
-            </a:r>
-          </a:p>
-        </p:txBody>
-      </p:sp>
-      <p:graphicFrame>
-        <p:nvGraphicFramePr>
-          <p:cNvPr id="4" name="Content Placeholder 3">
-            <a:extLst>
-              <a:ext uri="{FF2B5EF4-FFF2-40B4-BE49-F238E27FC236}">
-                <a16:creationId xmlns:a16="http://schemas.microsoft.com/office/drawing/2014/main" id="{E1C2739E-18DA-4EC1-A03F-130DF4E6013C}"/>
-              </a:ext>
-            </a:extLst>
-          </p:cNvPr>
-          <p:cNvGraphicFramePr>
-            <a:graphicFrameLocks noGrp="1"/>
-          </p:cNvGraphicFramePr>
-          <p:nvPr>
-            <p:ph idx="1"/>
-            <p:extLst>
-              <p:ext uri="{D42A27DB-BD31-4B8C-83A1-F6EECF244321}">
-                <p14:modId xmlns:p14="http://schemas.microsoft.com/office/powerpoint/2010/main" val="3601426238"/>
-              </p:ext>
-            </p:extLst>
-          </p:nvPr>
-        </p:nvGraphicFramePr>
-        <p:xfrm>
-          <a:off x="2499692" y="2117176"/>
-          <a:ext cx="7192617" cy="2799385"/>
-        </p:xfrm>
-        <a:graphic>
-          <a:graphicData uri="http://schemas.openxmlformats.org/drawingml/2006/diagram">
-            <dgm:relIds xmlns:dgm="http://schemas.openxmlformats.org/drawingml/2006/diagram" xmlns:r="http://schemas.openxmlformats.org/officeDocument/2006/relationships" r:dm="rId2" r:lo="rId3" r:qs="rId4" r:cs="rId5"/>
-          </a:graphicData>
-        </a:graphic>
-      </p:graphicFrame>
-      <p:sp>
-        <p:nvSpPr>
-          <p:cNvPr id="5" name="TextBox 4">
-            <a:extLst>
-              <a:ext uri="{FF2B5EF4-FFF2-40B4-BE49-F238E27FC236}">
-                <a16:creationId xmlns:a16="http://schemas.microsoft.com/office/drawing/2014/main" id="{ABE5A290-561B-4259-BAA4-CD33A510BD2A}"/>
-              </a:ext>
-            </a:extLst>
-          </p:cNvPr>
-          <p:cNvSpPr txBox="1"/>
-          <p:nvPr/>
-        </p:nvSpPr>
-        <p:spPr>
-          <a:xfrm>
-            <a:off x="3710609" y="5213307"/>
-            <a:ext cx="1517147" cy="461665"/>
-          </a:xfrm>
-          <a:prstGeom prst="rect">
-            <a:avLst/>
-          </a:prstGeom>
-          <a:noFill/>
-        </p:spPr>
-        <p:txBody>
-          <a:bodyPr wrap="none" rtlCol="0">
-            <a:spAutoFit/>
-          </a:bodyPr>
-          <a:lstStyle/>
-          <a:p>
-            <a:r>
-              <a:rPr lang="en-MY" sz="2400" dirty="0"/>
-              <a:t>controllers</a:t>
-            </a:r>
+              <a:rPr lang="en-US" dirty="0" smtClean="0"/>
+              <a:t>Chapter 5: </a:t>
+            </a:r>
+            <a:r>
+              <a:rPr lang="zh-CN" altLang="en-US" dirty="0" smtClean="0"/>
+              <a:t>类与特性 </a:t>
+            </a:r>
+            <a:r>
+              <a:rPr lang="en-US" altLang="zh-CN" dirty="0" smtClean="0"/>
+              <a:t>Class &amp; Trait</a:t>
+            </a:r>
+            <a:endParaRPr lang="en-US" dirty="0"/>
           </a:p>
         </p:txBody>
       </p:sp>
       <p:sp>
         <p:nvSpPr>
-          <p:cNvPr id="6" name="TextBox 5">
-            <a:extLst>
-              <a:ext uri="{FF2B5EF4-FFF2-40B4-BE49-F238E27FC236}">
-                <a16:creationId xmlns:a16="http://schemas.microsoft.com/office/drawing/2014/main" id="{37B74463-DBE4-413A-B885-F77F4E0413A3}"/>
-              </a:ext>
-            </a:extLst>
-          </p:cNvPr>
-          <p:cNvSpPr txBox="1"/>
-          <p:nvPr/>
+          <p:cNvPr id="3" name="Content Placeholder 2"/>
+          <p:cNvSpPr>
+            <a:spLocks noGrp="1"/>
+          </p:cNvSpPr>
+          <p:nvPr>
+            <p:ph idx="1"/>
+          </p:nvPr>
         </p:nvSpPr>
-        <p:spPr>
-          <a:xfrm>
-            <a:off x="7586869" y="5205254"/>
-            <a:ext cx="884216" cy="461665"/>
-          </a:xfrm>
-          <a:prstGeom prst="rect">
-            <a:avLst/>
-          </a:prstGeom>
-          <a:noFill/>
-        </p:spPr>
+        <p:spPr/>
         <p:txBody>
-          <a:bodyPr wrap="none" rtlCol="0">
-            <a:spAutoFit/>
-          </a:bodyPr>
+          <a:bodyPr/>
           <a:lstStyle/>
           <a:p>
-            <a:r>
-              <a:rPr lang="en-MY" sz="2400" dirty="0"/>
-              <a:t>views</a:t>
-            </a:r>
+            <a:endParaRPr lang="en-US"/>
           </a:p>
         </p:txBody>
       </p:sp>
     </p:spTree>
     <p:extLst>
       <p:ext uri="{BB962C8B-B14F-4D97-AF65-F5344CB8AC3E}">
-        <p14:creationId xmlns:p14="http://schemas.microsoft.com/office/powerpoint/2010/main" val="2927943225"/>
+        <p14:creationId xmlns:p14="http://schemas.microsoft.com/office/powerpoint/2010/main" val="535302529"/>
       </p:ext>
     </p:extLst>
   </p:cSld>
@@ -8534,7 +9561,7 @@
     </a:clrScheme>
     <a:fontScheme name="Office">
       <a:majorFont>
-        <a:latin typeface="Calibri Light" panose="020F0302020204030204"/>
+        <a:latin typeface="Calibri Light"/>
         <a:ea typeface=""/>
         <a:cs typeface=""/>
         <a:font script="Jpan" typeface="游ゴシック Light"/>
@@ -8586,7 +9613,7 @@
         <a:font script="Tfng" typeface="Ebrima"/>
       </a:majorFont>
       <a:minorFont>
-        <a:latin typeface="Calibri" panose="020F0502020204030204"/>
+        <a:latin typeface="Calibri"/>
         <a:ea typeface=""/>
         <a:cs typeface=""/>
         <a:font script="Jpan" typeface="游ゴシック"/>
@@ -8780,7 +9807,7 @@
   <a:extraClrSchemeLst/>
   <a:extLst>
     <a:ext uri="{05A4C25C-085E-4340-85A3-A5531E510DB2}">
-      <thm15:themeFamily xmlns:thm15="http://schemas.microsoft.com/office/thememl/2012/main" name="Office Theme" id="{62F939B6-93AF-4DB8-9C6B-D6C7DFDC589F}" vid="{4A3C46E8-61CC-4603-A589-7422A47A8E4A}"/>
+      <thm15:themeFamily xmlns:thm15="http://schemas.microsoft.com/office/thememl/2012/main" xmlns="" name="Office Theme" id="{62F939B6-93AF-4DB8-9C6B-D6C7DFDC589F}" vid="{4A3C46E8-61CC-4603-A589-7422A47A8E4A}"/>
     </a:ext>
   </a:extLst>
 </a:theme>

</xml_diff>